<commit_message>
Changes in the code, presentation and apk build
Changes in the code: added AsyncTask for building a result, changed the way history works, added an ability to delete items, renewed ANTLR libraries; presentation: added little feauters; new APK
</commit_message>
<xml_diff>
--- a/Защита проекта по приложению logic..pptx
+++ b/Защита проекта по приложению logic..pptx
@@ -201,7 +201,7 @@
           <a:p>
             <a:fld id="{59F32FEB-825F-4898-9368-CDB897B6B369}" type="datetimeFigureOut">
               <a:rPr lang="ru-RU" smtClean="0"/>
-              <a:t>09.06.2020</a:t>
+              <a:t>25.06.2020</a:t>
             </a:fld>
             <a:endParaRPr lang="ru-RU"/>
           </a:p>
@@ -1607,7 +1607,7 @@
             <a:fld id="{B4C71EC6-210F-42DE-9C53-41977AD35B3D}" type="datetimeFigureOut">
               <a:rPr lang="ru-RU" smtClean="0"/>
               <a:pPr/>
-              <a:t>09.06.2020</a:t>
+              <a:t>25.06.2020</a:t>
             </a:fld>
             <a:endParaRPr lang="ru-RU"/>
           </a:p>
@@ -1774,7 +1774,7 @@
             <a:fld id="{B4C71EC6-210F-42DE-9C53-41977AD35B3D}" type="datetimeFigureOut">
               <a:rPr lang="ru-RU" smtClean="0"/>
               <a:pPr/>
-              <a:t>09.06.2020</a:t>
+              <a:t>25.06.2020</a:t>
             </a:fld>
             <a:endParaRPr lang="ru-RU"/>
           </a:p>
@@ -1951,7 +1951,7 @@
             <a:fld id="{B4C71EC6-210F-42DE-9C53-41977AD35B3D}" type="datetimeFigureOut">
               <a:rPr lang="ru-RU" smtClean="0"/>
               <a:pPr/>
-              <a:t>09.06.2020</a:t>
+              <a:t>25.06.2020</a:t>
             </a:fld>
             <a:endParaRPr lang="ru-RU"/>
           </a:p>
@@ -2118,7 +2118,7 @@
             <a:fld id="{B4C71EC6-210F-42DE-9C53-41977AD35B3D}" type="datetimeFigureOut">
               <a:rPr lang="ru-RU" smtClean="0"/>
               <a:pPr/>
-              <a:t>09.06.2020</a:t>
+              <a:t>25.06.2020</a:t>
             </a:fld>
             <a:endParaRPr lang="ru-RU"/>
           </a:p>
@@ -2361,7 +2361,7 @@
             <a:fld id="{B4C71EC6-210F-42DE-9C53-41977AD35B3D}" type="datetimeFigureOut">
               <a:rPr lang="ru-RU" smtClean="0"/>
               <a:pPr/>
-              <a:t>09.06.2020</a:t>
+              <a:t>25.06.2020</a:t>
             </a:fld>
             <a:endParaRPr lang="ru-RU"/>
           </a:p>
@@ -2646,7 +2646,7 @@
             <a:fld id="{B4C71EC6-210F-42DE-9C53-41977AD35B3D}" type="datetimeFigureOut">
               <a:rPr lang="ru-RU" smtClean="0"/>
               <a:pPr/>
-              <a:t>09.06.2020</a:t>
+              <a:t>25.06.2020</a:t>
             </a:fld>
             <a:endParaRPr lang="ru-RU"/>
           </a:p>
@@ -3065,7 +3065,7 @@
             <a:fld id="{B4C71EC6-210F-42DE-9C53-41977AD35B3D}" type="datetimeFigureOut">
               <a:rPr lang="ru-RU" smtClean="0"/>
               <a:pPr/>
-              <a:t>09.06.2020</a:t>
+              <a:t>25.06.2020</a:t>
             </a:fld>
             <a:endParaRPr lang="ru-RU"/>
           </a:p>
@@ -3180,7 +3180,7 @@
             <a:fld id="{B4C71EC6-210F-42DE-9C53-41977AD35B3D}" type="datetimeFigureOut">
               <a:rPr lang="ru-RU" smtClean="0"/>
               <a:pPr/>
-              <a:t>09.06.2020</a:t>
+              <a:t>25.06.2020</a:t>
             </a:fld>
             <a:endParaRPr lang="ru-RU"/>
           </a:p>
@@ -3272,7 +3272,7 @@
             <a:fld id="{B4C71EC6-210F-42DE-9C53-41977AD35B3D}" type="datetimeFigureOut">
               <a:rPr lang="ru-RU" smtClean="0"/>
               <a:pPr/>
-              <a:t>09.06.2020</a:t>
+              <a:t>25.06.2020</a:t>
             </a:fld>
             <a:endParaRPr lang="ru-RU"/>
           </a:p>
@@ -3546,7 +3546,7 @@
             <a:fld id="{B4C71EC6-210F-42DE-9C53-41977AD35B3D}" type="datetimeFigureOut">
               <a:rPr lang="ru-RU" smtClean="0"/>
               <a:pPr/>
-              <a:t>09.06.2020</a:t>
+              <a:t>25.06.2020</a:t>
             </a:fld>
             <a:endParaRPr lang="ru-RU"/>
           </a:p>
@@ -3796,7 +3796,7 @@
             <a:fld id="{B4C71EC6-210F-42DE-9C53-41977AD35B3D}" type="datetimeFigureOut">
               <a:rPr lang="ru-RU" smtClean="0"/>
               <a:pPr/>
-              <a:t>09.06.2020</a:t>
+              <a:t>25.06.2020</a:t>
             </a:fld>
             <a:endParaRPr lang="ru-RU"/>
           </a:p>
@@ -4015,7 +4015,7 @@
             <a:fld id="{B4C71EC6-210F-42DE-9C53-41977AD35B3D}" type="datetimeFigureOut">
               <a:rPr lang="ru-RU" smtClean="0"/>
               <a:pPr/>
-              <a:t>09.06.2020</a:t>
+              <a:t>25.06.2020</a:t>
             </a:fld>
             <a:endParaRPr lang="ru-RU"/>
           </a:p>
@@ -4981,6 +4981,62 @@
           </a:p>
         </p:txBody>
       </p:sp>
+      <p:sp>
+        <p:nvSpPr>
+          <p:cNvPr id="2" name="TextBox 1"/>
+          <p:cNvSpPr txBox="1"/>
+          <p:nvPr/>
+        </p:nvSpPr>
+        <p:spPr>
+          <a:xfrm>
+            <a:off x="212238" y="4737972"/>
+            <a:ext cx="848309" cy="261610"/>
+          </a:xfrm>
+          <a:prstGeom prst="rect">
+            <a:avLst/>
+          </a:prstGeom>
+          <a:noFill/>
+        </p:spPr>
+        <p:txBody>
+          <a:bodyPr wrap="none" rtlCol="0">
+            <a:spAutoFit/>
+          </a:bodyPr>
+          <a:lstStyle/>
+          <a:p>
+            <a:r>
+              <a:rPr lang="ru-RU" sz="1100" dirty="0" smtClean="0">
+                <a:solidFill>
+                  <a:schemeClr val="bg1"/>
+                </a:solidFill>
+                <a:effectLst>
+                  <a:outerShdw blurRad="38100" dist="38100" dir="2700000" algn="tl">
+                    <a:srgbClr val="000000">
+                      <a:alpha val="43137"/>
+                    </a:srgbClr>
+                  </a:outerShdw>
+                </a:effectLst>
+                <a:latin typeface="Segoe UI" panose="020B0502040204020203" pitchFamily="34" charset="0"/>
+                <a:cs typeface="Segoe UI" panose="020B0502040204020203" pitchFamily="34" charset="0"/>
+              </a:rPr>
+              <a:t>Слайд №1</a:t>
+            </a:r>
+            <a:endParaRPr lang="ru-RU" sz="1100" dirty="0">
+              <a:solidFill>
+                <a:schemeClr val="bg1"/>
+              </a:solidFill>
+              <a:effectLst>
+                <a:outerShdw blurRad="38100" dist="38100" dir="2700000" algn="tl">
+                  <a:srgbClr val="000000">
+                    <a:alpha val="43137"/>
+                  </a:srgbClr>
+                </a:outerShdw>
+              </a:effectLst>
+              <a:latin typeface="Segoe UI" panose="020B0502040204020203" pitchFamily="34" charset="0"/>
+              <a:cs typeface="Segoe UI" panose="020B0502040204020203" pitchFamily="34" charset="0"/>
+            </a:endParaRPr>
+          </a:p>
+        </p:txBody>
+      </p:sp>
     </p:spTree>
     <p:extLst>
       <p:ext uri="{BB962C8B-B14F-4D97-AF65-F5344CB8AC3E}">
@@ -5680,6 +5736,62 @@
           </a:fontRef>
         </p:style>
       </p:cxnSp>
+      <p:sp>
+        <p:nvSpPr>
+          <p:cNvPr id="15" name="TextBox 14"/>
+          <p:cNvSpPr txBox="1"/>
+          <p:nvPr/>
+        </p:nvSpPr>
+        <p:spPr>
+          <a:xfrm>
+            <a:off x="8167087" y="356441"/>
+            <a:ext cx="848309" cy="261610"/>
+          </a:xfrm>
+          <a:prstGeom prst="rect">
+            <a:avLst/>
+          </a:prstGeom>
+          <a:noFill/>
+        </p:spPr>
+        <p:txBody>
+          <a:bodyPr wrap="none" rtlCol="0">
+            <a:spAutoFit/>
+          </a:bodyPr>
+          <a:lstStyle/>
+          <a:p>
+            <a:r>
+              <a:rPr lang="ru-RU" sz="1100" dirty="0" smtClean="0">
+                <a:solidFill>
+                  <a:schemeClr val="bg1"/>
+                </a:solidFill>
+                <a:effectLst>
+                  <a:outerShdw blurRad="38100" dist="38100" dir="2700000" algn="tl">
+                    <a:srgbClr val="000000">
+                      <a:alpha val="43137"/>
+                    </a:srgbClr>
+                  </a:outerShdw>
+                </a:effectLst>
+                <a:latin typeface="Segoe UI" panose="020B0502040204020203" pitchFamily="34" charset="0"/>
+                <a:cs typeface="Segoe UI" panose="020B0502040204020203" pitchFamily="34" charset="0"/>
+              </a:rPr>
+              <a:t>Слайд №2</a:t>
+            </a:r>
+            <a:endParaRPr lang="ru-RU" sz="1100" dirty="0">
+              <a:solidFill>
+                <a:schemeClr val="bg1"/>
+              </a:solidFill>
+              <a:effectLst>
+                <a:outerShdw blurRad="38100" dist="38100" dir="2700000" algn="tl">
+                  <a:srgbClr val="000000">
+                    <a:alpha val="43137"/>
+                  </a:srgbClr>
+                </a:outerShdw>
+              </a:effectLst>
+              <a:latin typeface="Segoe UI" panose="020B0502040204020203" pitchFamily="34" charset="0"/>
+              <a:cs typeface="Segoe UI" panose="020B0502040204020203" pitchFamily="34" charset="0"/>
+            </a:endParaRPr>
+          </a:p>
+        </p:txBody>
+      </p:sp>
     </p:spTree>
     <p:extLst>
       <p:ext uri="{BB962C8B-B14F-4D97-AF65-F5344CB8AC3E}">
@@ -5847,7 +5959,7 @@
                                           </p:stCondLst>
                                         </p:cTn>
                                         <p:tgtEl>
-                                          <p:spTgt spid="7"/>
+                                          <p:spTgt spid="20"/>
                                         </p:tgtEl>
                                         <p:attrNameLst>
                                           <p:attrName>style.visibility</p:attrName>
@@ -5861,7 +5973,7 @@
                                       <p:cBhvr>
                                         <p:cTn id="18" dur="500"/>
                                         <p:tgtEl>
-                                          <p:spTgt spid="7"/>
+                                          <p:spTgt spid="20"/>
                                         </p:tgtEl>
                                       </p:cBhvr>
                                     </p:animEffect>
@@ -5882,7 +5994,7 @@
                                           </p:stCondLst>
                                         </p:cTn>
                                         <p:tgtEl>
-                                          <p:spTgt spid="1026"/>
+                                          <p:spTgt spid="1028"/>
                                         </p:tgtEl>
                                         <p:attrNameLst>
                                           <p:attrName>style.visibility</p:attrName>
@@ -5895,94 +6007,6 @@
                                     <p:animEffect transition="in" filter="fade">
                                       <p:cBhvr>
                                         <p:cTn id="21" dur="500"/>
-                                        <p:tgtEl>
-                                          <p:spTgt spid="1026"/>
-                                        </p:tgtEl>
-                                      </p:cBhvr>
-                                    </p:animEffect>
-                                  </p:childTnLst>
-                                </p:cTn>
-                              </p:par>
-                            </p:childTnLst>
-                          </p:cTn>
-                        </p:par>
-                      </p:childTnLst>
-                    </p:cTn>
-                  </p:par>
-                  <p:par>
-                    <p:cTn id="22" fill="hold">
-                      <p:stCondLst>
-                        <p:cond delay="indefinite"/>
-                      </p:stCondLst>
-                      <p:childTnLst>
-                        <p:par>
-                          <p:cTn id="23" fill="hold">
-                            <p:stCondLst>
-                              <p:cond delay="0"/>
-                            </p:stCondLst>
-                            <p:childTnLst>
-                              <p:par>
-                                <p:cTn id="24" presetID="10" presetClass="entr" presetSubtype="0" fill="hold" nodeType="clickEffect">
-                                  <p:stCondLst>
-                                    <p:cond delay="0"/>
-                                  </p:stCondLst>
-                                  <p:childTnLst>
-                                    <p:set>
-                                      <p:cBhvr>
-                                        <p:cTn id="25" dur="1" fill="hold">
-                                          <p:stCondLst>
-                                            <p:cond delay="0"/>
-                                          </p:stCondLst>
-                                        </p:cTn>
-                                        <p:tgtEl>
-                                          <p:spTgt spid="20"/>
-                                        </p:tgtEl>
-                                        <p:attrNameLst>
-                                          <p:attrName>style.visibility</p:attrName>
-                                        </p:attrNameLst>
-                                      </p:cBhvr>
-                                      <p:to>
-                                        <p:strVal val="visible"/>
-                                      </p:to>
-                                    </p:set>
-                                    <p:animEffect transition="in" filter="fade">
-                                      <p:cBhvr>
-                                        <p:cTn id="26" dur="500"/>
-                                        <p:tgtEl>
-                                          <p:spTgt spid="20"/>
-                                        </p:tgtEl>
-                                      </p:cBhvr>
-                                    </p:animEffect>
-                                  </p:childTnLst>
-                                </p:cTn>
-                              </p:par>
-                              <p:par>
-                                <p:cTn id="27" presetID="10" presetClass="entr" presetSubtype="0" fill="hold" nodeType="withEffect">
-                                  <p:stCondLst>
-                                    <p:cond delay="0"/>
-                                  </p:stCondLst>
-                                  <p:childTnLst>
-                                    <p:set>
-                                      <p:cBhvr>
-                                        <p:cTn id="28" dur="1" fill="hold">
-                                          <p:stCondLst>
-                                            <p:cond delay="0"/>
-                                          </p:stCondLst>
-                                        </p:cTn>
-                                        <p:tgtEl>
-                                          <p:spTgt spid="1028"/>
-                                        </p:tgtEl>
-                                        <p:attrNameLst>
-                                          <p:attrName>style.visibility</p:attrName>
-                                        </p:attrNameLst>
-                                      </p:cBhvr>
-                                      <p:to>
-                                        <p:strVal val="visible"/>
-                                      </p:to>
-                                    </p:set>
-                                    <p:animEffect transition="in" filter="fade">
-                                      <p:cBhvr>
-                                        <p:cTn id="29" dur="500"/>
                                         <p:tgtEl>
                                           <p:spTgt spid="1028"/>
                                         </p:tgtEl>
@@ -6323,6 +6347,62 @@
               </a:solidFill>
               <a:latin typeface="Segoe UI Semibold" panose="020B0702040204020203" pitchFamily="34" charset="0"/>
               <a:cs typeface="Segoe UI Semibold" panose="020B0702040204020203" pitchFamily="34" charset="0"/>
+            </a:endParaRPr>
+          </a:p>
+        </p:txBody>
+      </p:sp>
+      <p:sp>
+        <p:nvSpPr>
+          <p:cNvPr id="11" name="TextBox 10"/>
+          <p:cNvSpPr txBox="1"/>
+          <p:nvPr/>
+        </p:nvSpPr>
+        <p:spPr>
+          <a:xfrm>
+            <a:off x="8167087" y="356441"/>
+            <a:ext cx="848309" cy="261610"/>
+          </a:xfrm>
+          <a:prstGeom prst="rect">
+            <a:avLst/>
+          </a:prstGeom>
+          <a:noFill/>
+        </p:spPr>
+        <p:txBody>
+          <a:bodyPr wrap="none" rtlCol="0">
+            <a:spAutoFit/>
+          </a:bodyPr>
+          <a:lstStyle/>
+          <a:p>
+            <a:r>
+              <a:rPr lang="ru-RU" sz="1100" dirty="0" smtClean="0">
+                <a:solidFill>
+                  <a:schemeClr val="bg1"/>
+                </a:solidFill>
+                <a:effectLst>
+                  <a:outerShdw blurRad="38100" dist="38100" dir="2700000" algn="tl">
+                    <a:srgbClr val="000000">
+                      <a:alpha val="43137"/>
+                    </a:srgbClr>
+                  </a:outerShdw>
+                </a:effectLst>
+                <a:latin typeface="Segoe UI" panose="020B0502040204020203" pitchFamily="34" charset="0"/>
+                <a:cs typeface="Segoe UI" panose="020B0502040204020203" pitchFamily="34" charset="0"/>
+              </a:rPr>
+              <a:t>Слайд №3</a:t>
+            </a:r>
+            <a:endParaRPr lang="ru-RU" sz="1100" dirty="0">
+              <a:solidFill>
+                <a:schemeClr val="bg1"/>
+              </a:solidFill>
+              <a:effectLst>
+                <a:outerShdw blurRad="38100" dist="38100" dir="2700000" algn="tl">
+                  <a:srgbClr val="000000">
+                    <a:alpha val="43137"/>
+                  </a:srgbClr>
+                </a:outerShdw>
+              </a:effectLst>
+              <a:latin typeface="Segoe UI" panose="020B0502040204020203" pitchFamily="34" charset="0"/>
+              <a:cs typeface="Segoe UI" panose="020B0502040204020203" pitchFamily="34" charset="0"/>
             </a:endParaRPr>
           </a:p>
         </p:txBody>
@@ -6856,6 +6936,62 @@
           </a:extLst>
         </p:spPr>
       </p:pic>
+      <p:sp>
+        <p:nvSpPr>
+          <p:cNvPr id="9" name="TextBox 8"/>
+          <p:cNvSpPr txBox="1"/>
+          <p:nvPr/>
+        </p:nvSpPr>
+        <p:spPr>
+          <a:xfrm>
+            <a:off x="8167087" y="356441"/>
+            <a:ext cx="848309" cy="261610"/>
+          </a:xfrm>
+          <a:prstGeom prst="rect">
+            <a:avLst/>
+          </a:prstGeom>
+          <a:noFill/>
+        </p:spPr>
+        <p:txBody>
+          <a:bodyPr wrap="none" rtlCol="0">
+            <a:spAutoFit/>
+          </a:bodyPr>
+          <a:lstStyle/>
+          <a:p>
+            <a:r>
+              <a:rPr lang="ru-RU" sz="1100" dirty="0" smtClean="0">
+                <a:solidFill>
+                  <a:schemeClr val="bg1"/>
+                </a:solidFill>
+                <a:effectLst>
+                  <a:outerShdw blurRad="38100" dist="38100" dir="2700000" algn="tl">
+                    <a:srgbClr val="000000">
+                      <a:alpha val="43137"/>
+                    </a:srgbClr>
+                  </a:outerShdw>
+                </a:effectLst>
+                <a:latin typeface="Segoe UI" panose="020B0502040204020203" pitchFamily="34" charset="0"/>
+                <a:cs typeface="Segoe UI" panose="020B0502040204020203" pitchFamily="34" charset="0"/>
+              </a:rPr>
+              <a:t>Слайд №4</a:t>
+            </a:r>
+            <a:endParaRPr lang="ru-RU" sz="1100" dirty="0">
+              <a:solidFill>
+                <a:schemeClr val="bg1"/>
+              </a:solidFill>
+              <a:effectLst>
+                <a:outerShdw blurRad="38100" dist="38100" dir="2700000" algn="tl">
+                  <a:srgbClr val="000000">
+                    <a:alpha val="43137"/>
+                  </a:srgbClr>
+                </a:outerShdw>
+              </a:effectLst>
+              <a:latin typeface="Segoe UI" panose="020B0502040204020203" pitchFamily="34" charset="0"/>
+              <a:cs typeface="Segoe UI" panose="020B0502040204020203" pitchFamily="34" charset="0"/>
+            </a:endParaRPr>
+          </a:p>
+        </p:txBody>
+      </p:sp>
     </p:spTree>
     <p:extLst>
       <p:ext uri="{BB962C8B-B14F-4D97-AF65-F5344CB8AC3E}">
@@ -7492,6 +7628,62 @@
               </a:solidFill>
               <a:latin typeface="Segoe UI Semilight" panose="020B0402040204020203" pitchFamily="34" charset="0"/>
               <a:cs typeface="Segoe UI Semilight" panose="020B0402040204020203" pitchFamily="34" charset="0"/>
+            </a:endParaRPr>
+          </a:p>
+        </p:txBody>
+      </p:sp>
+      <p:sp>
+        <p:nvSpPr>
+          <p:cNvPr id="14" name="TextBox 13"/>
+          <p:cNvSpPr txBox="1"/>
+          <p:nvPr/>
+        </p:nvSpPr>
+        <p:spPr>
+          <a:xfrm>
+            <a:off x="8167087" y="356441"/>
+            <a:ext cx="848309" cy="261610"/>
+          </a:xfrm>
+          <a:prstGeom prst="rect">
+            <a:avLst/>
+          </a:prstGeom>
+          <a:noFill/>
+        </p:spPr>
+        <p:txBody>
+          <a:bodyPr wrap="none" rtlCol="0">
+            <a:spAutoFit/>
+          </a:bodyPr>
+          <a:lstStyle/>
+          <a:p>
+            <a:r>
+              <a:rPr lang="ru-RU" sz="1100" dirty="0" smtClean="0">
+                <a:solidFill>
+                  <a:schemeClr val="bg1"/>
+                </a:solidFill>
+                <a:effectLst>
+                  <a:outerShdw blurRad="38100" dist="38100" dir="2700000" algn="tl">
+                    <a:srgbClr val="000000">
+                      <a:alpha val="43137"/>
+                    </a:srgbClr>
+                  </a:outerShdw>
+                </a:effectLst>
+                <a:latin typeface="Segoe UI" panose="020B0502040204020203" pitchFamily="34" charset="0"/>
+                <a:cs typeface="Segoe UI" panose="020B0502040204020203" pitchFamily="34" charset="0"/>
+              </a:rPr>
+              <a:t>Слайд №5</a:t>
+            </a:r>
+            <a:endParaRPr lang="ru-RU" sz="1100" dirty="0">
+              <a:solidFill>
+                <a:schemeClr val="bg1"/>
+              </a:solidFill>
+              <a:effectLst>
+                <a:outerShdw blurRad="38100" dist="38100" dir="2700000" algn="tl">
+                  <a:srgbClr val="000000">
+                    <a:alpha val="43137"/>
+                  </a:srgbClr>
+                </a:outerShdw>
+              </a:effectLst>
+              <a:latin typeface="Segoe UI" panose="020B0502040204020203" pitchFamily="34" charset="0"/>
+              <a:cs typeface="Segoe UI" panose="020B0502040204020203" pitchFamily="34" charset="0"/>
             </a:endParaRPr>
           </a:p>
         </p:txBody>
@@ -8429,6 +8621,62 @@
           </a:p>
         </p:txBody>
       </p:sp>
+      <p:sp>
+        <p:nvSpPr>
+          <p:cNvPr id="15" name="TextBox 14"/>
+          <p:cNvSpPr txBox="1"/>
+          <p:nvPr/>
+        </p:nvSpPr>
+        <p:spPr>
+          <a:xfrm>
+            <a:off x="8167087" y="356441"/>
+            <a:ext cx="848309" cy="261610"/>
+          </a:xfrm>
+          <a:prstGeom prst="rect">
+            <a:avLst/>
+          </a:prstGeom>
+          <a:noFill/>
+        </p:spPr>
+        <p:txBody>
+          <a:bodyPr wrap="none" rtlCol="0">
+            <a:spAutoFit/>
+          </a:bodyPr>
+          <a:lstStyle/>
+          <a:p>
+            <a:r>
+              <a:rPr lang="ru-RU" sz="1100" dirty="0" smtClean="0">
+                <a:solidFill>
+                  <a:schemeClr val="bg1"/>
+                </a:solidFill>
+                <a:effectLst>
+                  <a:outerShdw blurRad="38100" dist="38100" dir="2700000" algn="tl">
+                    <a:srgbClr val="000000">
+                      <a:alpha val="43137"/>
+                    </a:srgbClr>
+                  </a:outerShdw>
+                </a:effectLst>
+                <a:latin typeface="Segoe UI" panose="020B0502040204020203" pitchFamily="34" charset="0"/>
+                <a:cs typeface="Segoe UI" panose="020B0502040204020203" pitchFamily="34" charset="0"/>
+              </a:rPr>
+              <a:t>Слайд №6</a:t>
+            </a:r>
+            <a:endParaRPr lang="ru-RU" sz="1100" dirty="0">
+              <a:solidFill>
+                <a:schemeClr val="bg1"/>
+              </a:solidFill>
+              <a:effectLst>
+                <a:outerShdw blurRad="38100" dist="38100" dir="2700000" algn="tl">
+                  <a:srgbClr val="000000">
+                    <a:alpha val="43137"/>
+                  </a:srgbClr>
+                </a:outerShdw>
+              </a:effectLst>
+              <a:latin typeface="Segoe UI" panose="020B0502040204020203" pitchFamily="34" charset="0"/>
+              <a:cs typeface="Segoe UI" panose="020B0502040204020203" pitchFamily="34" charset="0"/>
+            </a:endParaRPr>
+          </a:p>
+        </p:txBody>
+      </p:sp>
     </p:spTree>
     <p:extLst>
       <p:ext uri="{BB962C8B-B14F-4D97-AF65-F5344CB8AC3E}">
@@ -8606,7 +8854,7 @@
         </p:nvSpPr>
         <p:spPr>
           <a:xfrm>
-            <a:off x="1704878" y="1968336"/>
+            <a:off x="1704878" y="1976958"/>
             <a:ext cx="2124224" cy="792088"/>
           </a:xfrm>
           <a:prstGeom prst="roundRect">
@@ -8901,7 +9149,7 @@
                 <a:latin typeface="Segoe UI" panose="020B0502040204020203" pitchFamily="34" charset="0"/>
                 <a:cs typeface="Segoe UI" panose="020B0502040204020203" pitchFamily="34" charset="0"/>
               </a:rPr>
-              <a:t>Activity</a:t>
+              <a:t>Activity1</a:t>
             </a:r>
             <a:endParaRPr lang="ru-RU" sz="1600" dirty="0">
               <a:solidFill>
@@ -8963,8 +9211,8 @@
         </p:nvCxnSpPr>
         <p:spPr>
           <a:xfrm rot="16200000" flipH="1">
-            <a:off x="2140775" y="1342121"/>
-            <a:ext cx="288032" cy="964397"/>
+            <a:off x="2136464" y="1346432"/>
+            <a:ext cx="296654" cy="964397"/>
           </a:xfrm>
           <a:prstGeom prst="curvedConnector3">
             <a:avLst/>
@@ -9002,8 +9250,8 @@
         </p:nvCxnSpPr>
         <p:spPr>
           <a:xfrm rot="5400000">
-            <a:off x="3105173" y="1342121"/>
-            <a:ext cx="288032" cy="964398"/>
+            <a:off x="3100862" y="1346432"/>
+            <a:ext cx="296654" cy="964398"/>
           </a:xfrm>
           <a:prstGeom prst="curvedConnector3">
             <a:avLst/>
@@ -9038,7 +9286,7 @@
         </p:nvSpPr>
         <p:spPr>
           <a:xfrm>
-            <a:off x="3079215" y="2112352"/>
+            <a:off x="3070943" y="2170732"/>
             <a:ext cx="508521" cy="360040"/>
           </a:xfrm>
           <a:prstGeom prst="roundRect">
@@ -9109,7 +9357,7 @@
         </p:nvSpPr>
         <p:spPr>
           <a:xfrm>
-            <a:off x="3150859" y="2184360"/>
+            <a:off x="3142587" y="2242740"/>
             <a:ext cx="508521" cy="360040"/>
           </a:xfrm>
           <a:prstGeom prst="roundRect">
@@ -9175,8 +9423,8 @@
         </p:nvCxnSpPr>
         <p:spPr>
           <a:xfrm>
-            <a:off x="2766990" y="2760424"/>
-            <a:ext cx="0" cy="287486"/>
+            <a:off x="2766990" y="2769046"/>
+            <a:ext cx="0" cy="278864"/>
           </a:xfrm>
           <a:prstGeom prst="straightConnector1">
             <a:avLst/>
@@ -9897,6 +10145,789 @@
           </a:fontRef>
         </p:style>
       </p:cxnSp>
+      <p:sp>
+        <p:nvSpPr>
+          <p:cNvPr id="29" name="TextBox 28"/>
+          <p:cNvSpPr txBox="1"/>
+          <p:nvPr/>
+        </p:nvSpPr>
+        <p:spPr>
+          <a:xfrm>
+            <a:off x="8167087" y="356441"/>
+            <a:ext cx="848309" cy="261610"/>
+          </a:xfrm>
+          <a:prstGeom prst="rect">
+            <a:avLst/>
+          </a:prstGeom>
+          <a:noFill/>
+        </p:spPr>
+        <p:txBody>
+          <a:bodyPr wrap="none" rtlCol="0">
+            <a:spAutoFit/>
+          </a:bodyPr>
+          <a:lstStyle/>
+          <a:p>
+            <a:r>
+              <a:rPr lang="ru-RU" sz="1100" dirty="0" smtClean="0">
+                <a:solidFill>
+                  <a:schemeClr val="bg1"/>
+                </a:solidFill>
+                <a:effectLst>
+                  <a:outerShdw blurRad="38100" dist="38100" dir="2700000" algn="tl">
+                    <a:srgbClr val="000000">
+                      <a:alpha val="43137"/>
+                    </a:srgbClr>
+                  </a:outerShdw>
+                </a:effectLst>
+                <a:latin typeface="Segoe UI" panose="020B0502040204020203" pitchFamily="34" charset="0"/>
+                <a:cs typeface="Segoe UI" panose="020B0502040204020203" pitchFamily="34" charset="0"/>
+              </a:rPr>
+              <a:t>Слайд №7</a:t>
+            </a:r>
+            <a:endParaRPr lang="ru-RU" sz="1100" dirty="0">
+              <a:solidFill>
+                <a:schemeClr val="bg1"/>
+              </a:solidFill>
+              <a:effectLst>
+                <a:outerShdw blurRad="38100" dist="38100" dir="2700000" algn="tl">
+                  <a:srgbClr val="000000">
+                    <a:alpha val="43137"/>
+                  </a:srgbClr>
+                </a:outerShdw>
+              </a:effectLst>
+              <a:latin typeface="Segoe UI" panose="020B0502040204020203" pitchFamily="34" charset="0"/>
+              <a:cs typeface="Segoe UI" panose="020B0502040204020203" pitchFamily="34" charset="0"/>
+            </a:endParaRPr>
+          </a:p>
+        </p:txBody>
+      </p:sp>
+      <p:sp>
+        <p:nvSpPr>
+          <p:cNvPr id="46" name="Скругленный прямоугольник 45"/>
+          <p:cNvSpPr/>
+          <p:nvPr/>
+        </p:nvSpPr>
+        <p:spPr>
+          <a:xfrm>
+            <a:off x="1092163" y="1976958"/>
+            <a:ext cx="1521444" cy="792088"/>
+          </a:xfrm>
+          <a:prstGeom prst="roundRect">
+            <a:avLst/>
+          </a:prstGeom>
+          <a:solidFill>
+            <a:schemeClr val="bg1"/>
+          </a:solidFill>
+          <a:ln>
+            <a:solidFill>
+              <a:schemeClr val="accent3"/>
+            </a:solidFill>
+          </a:ln>
+        </p:spPr>
+        <p:style>
+          <a:lnRef idx="2">
+            <a:schemeClr val="accent1">
+              <a:shade val="50000"/>
+            </a:schemeClr>
+          </a:lnRef>
+          <a:fillRef idx="1">
+            <a:schemeClr val="accent1"/>
+          </a:fillRef>
+          <a:effectRef idx="0">
+            <a:schemeClr val="accent1"/>
+          </a:effectRef>
+          <a:fontRef idx="minor">
+            <a:schemeClr val="lt1"/>
+          </a:fontRef>
+        </p:style>
+        <p:txBody>
+          <a:bodyPr rtlCol="0" anchor="ctr"/>
+          <a:lstStyle/>
+          <a:p>
+            <a:pPr algn="ctr"/>
+            <a:r>
+              <a:rPr lang="en-US" sz="1600" dirty="0" smtClean="0">
+                <a:solidFill>
+                  <a:schemeClr val="accent3"/>
+                </a:solidFill>
+                <a:latin typeface="Segoe UI" panose="020B0502040204020203" pitchFamily="34" charset="0"/>
+                <a:cs typeface="Segoe UI" panose="020B0502040204020203" pitchFamily="34" charset="0"/>
+              </a:rPr>
+              <a:t>ViewModel2</a:t>
+            </a:r>
+            <a:endParaRPr lang="ru-RU" sz="1600" dirty="0">
+              <a:solidFill>
+                <a:schemeClr val="accent3"/>
+              </a:solidFill>
+              <a:latin typeface="Segoe UI" panose="020B0502040204020203" pitchFamily="34" charset="0"/>
+              <a:cs typeface="Segoe UI" panose="020B0502040204020203" pitchFamily="34" charset="0"/>
+            </a:endParaRPr>
+          </a:p>
+        </p:txBody>
+      </p:sp>
+      <p:cxnSp>
+        <p:nvCxnSpPr>
+          <p:cNvPr id="30" name="Скругленная соединительная линия 29"/>
+          <p:cNvCxnSpPr>
+            <a:stCxn id="46" idx="2"/>
+            <a:endCxn id="7" idx="0"/>
+          </p:cNvCxnSpPr>
+          <p:nvPr/>
+        </p:nvCxnSpPr>
+        <p:spPr>
+          <a:xfrm rot="16200000" flipH="1">
+            <a:off x="2170505" y="2451425"/>
+            <a:ext cx="278864" cy="914105"/>
+          </a:xfrm>
+          <a:prstGeom prst="curvedConnector3">
+            <a:avLst/>
+          </a:prstGeom>
+          <a:ln w="19050">
+            <a:solidFill>
+              <a:schemeClr val="accent3"/>
+            </a:solidFill>
+            <a:tailEnd type="arrow"/>
+          </a:ln>
+        </p:spPr>
+        <p:style>
+          <a:lnRef idx="1">
+            <a:schemeClr val="accent1"/>
+          </a:lnRef>
+          <a:fillRef idx="0">
+            <a:schemeClr val="accent1"/>
+          </a:fillRef>
+          <a:effectRef idx="0">
+            <a:schemeClr val="accent1"/>
+          </a:effectRef>
+          <a:fontRef idx="minor">
+            <a:schemeClr val="tx1"/>
+          </a:fontRef>
+        </p:style>
+      </p:cxnSp>
+      <p:sp>
+        <p:nvSpPr>
+          <p:cNvPr id="57" name="Скругленный прямоугольник 56"/>
+          <p:cNvSpPr/>
+          <p:nvPr/>
+        </p:nvSpPr>
+        <p:spPr>
+          <a:xfrm>
+            <a:off x="2970666" y="1976958"/>
+            <a:ext cx="1521444" cy="792088"/>
+          </a:xfrm>
+          <a:prstGeom prst="roundRect">
+            <a:avLst/>
+          </a:prstGeom>
+          <a:solidFill>
+            <a:schemeClr val="bg1"/>
+          </a:solidFill>
+          <a:ln>
+            <a:solidFill>
+              <a:schemeClr val="accent3"/>
+            </a:solidFill>
+          </a:ln>
+        </p:spPr>
+        <p:style>
+          <a:lnRef idx="2">
+            <a:schemeClr val="accent1">
+              <a:shade val="50000"/>
+            </a:schemeClr>
+          </a:lnRef>
+          <a:fillRef idx="1">
+            <a:schemeClr val="accent1"/>
+          </a:fillRef>
+          <a:effectRef idx="0">
+            <a:schemeClr val="accent1"/>
+          </a:effectRef>
+          <a:fontRef idx="minor">
+            <a:schemeClr val="lt1"/>
+          </a:fontRef>
+        </p:style>
+        <p:txBody>
+          <a:bodyPr rtlCol="0" anchor="ctr"/>
+          <a:lstStyle/>
+          <a:p>
+            <a:pPr algn="ctr"/>
+            <a:r>
+              <a:rPr lang="en-US" sz="1600" dirty="0" smtClean="0">
+                <a:solidFill>
+                  <a:schemeClr val="accent3"/>
+                </a:solidFill>
+                <a:latin typeface="Segoe UI" panose="020B0502040204020203" pitchFamily="34" charset="0"/>
+                <a:cs typeface="Segoe UI" panose="020B0502040204020203" pitchFamily="34" charset="0"/>
+              </a:rPr>
+              <a:t>ViewModel1</a:t>
+            </a:r>
+            <a:endParaRPr lang="ru-RU" sz="1600" dirty="0">
+              <a:solidFill>
+                <a:schemeClr val="accent3"/>
+              </a:solidFill>
+              <a:latin typeface="Segoe UI" panose="020B0502040204020203" pitchFamily="34" charset="0"/>
+              <a:cs typeface="Segoe UI" panose="020B0502040204020203" pitchFamily="34" charset="0"/>
+            </a:endParaRPr>
+          </a:p>
+        </p:txBody>
+      </p:sp>
+      <p:cxnSp>
+        <p:nvCxnSpPr>
+          <p:cNvPr id="37" name="Скругленная соединительная линия 36"/>
+          <p:cNvCxnSpPr>
+            <a:stCxn id="57" idx="2"/>
+            <a:endCxn id="7" idx="0"/>
+          </p:cNvCxnSpPr>
+          <p:nvPr/>
+        </p:nvCxnSpPr>
+        <p:spPr>
+          <a:xfrm rot="5400000">
+            <a:off x="3109757" y="2426279"/>
+            <a:ext cx="278864" cy="964398"/>
+          </a:xfrm>
+          <a:prstGeom prst="curvedConnector3">
+            <a:avLst>
+              <a:gd name="adj1" fmla="val 50000"/>
+            </a:avLst>
+          </a:prstGeom>
+          <a:ln w="19050">
+            <a:solidFill>
+              <a:schemeClr val="accent3"/>
+            </a:solidFill>
+            <a:tailEnd type="arrow"/>
+          </a:ln>
+        </p:spPr>
+        <p:style>
+          <a:lnRef idx="1">
+            <a:schemeClr val="accent1"/>
+          </a:lnRef>
+          <a:fillRef idx="0">
+            <a:schemeClr val="accent1"/>
+          </a:fillRef>
+          <a:effectRef idx="0">
+            <a:schemeClr val="accent1"/>
+          </a:effectRef>
+          <a:fontRef idx="minor">
+            <a:schemeClr val="tx1"/>
+          </a:fontRef>
+        </p:style>
+      </p:cxnSp>
+      <p:sp>
+        <p:nvSpPr>
+          <p:cNvPr id="63" name="Скругленный прямоугольник 62"/>
+          <p:cNvSpPr/>
+          <p:nvPr/>
+        </p:nvSpPr>
+        <p:spPr>
+          <a:xfrm>
+            <a:off x="1060797" y="1105242"/>
+            <a:ext cx="1584176" cy="576064"/>
+          </a:xfrm>
+          <a:prstGeom prst="roundRect">
+            <a:avLst/>
+          </a:prstGeom>
+          <a:solidFill>
+            <a:schemeClr val="bg1"/>
+          </a:solidFill>
+          <a:ln>
+            <a:solidFill>
+              <a:schemeClr val="accent2"/>
+            </a:solidFill>
+          </a:ln>
+        </p:spPr>
+        <p:style>
+          <a:lnRef idx="2">
+            <a:schemeClr val="accent1">
+              <a:shade val="50000"/>
+            </a:schemeClr>
+          </a:lnRef>
+          <a:fillRef idx="1">
+            <a:schemeClr val="accent1"/>
+          </a:fillRef>
+          <a:effectRef idx="0">
+            <a:schemeClr val="accent1"/>
+          </a:effectRef>
+          <a:fontRef idx="minor">
+            <a:schemeClr val="lt1"/>
+          </a:fontRef>
+        </p:style>
+        <p:txBody>
+          <a:bodyPr rtlCol="0" anchor="ctr"/>
+          <a:lstStyle/>
+          <a:p>
+            <a:pPr algn="ctr"/>
+            <a:r>
+              <a:rPr lang="en-US" sz="1600" dirty="0" smtClean="0">
+                <a:solidFill>
+                  <a:schemeClr val="accent2"/>
+                </a:solidFill>
+                <a:latin typeface="Segoe UI" panose="020B0502040204020203" pitchFamily="34" charset="0"/>
+                <a:cs typeface="Segoe UI" panose="020B0502040204020203" pitchFamily="34" charset="0"/>
+              </a:rPr>
+              <a:t>Activity2</a:t>
+            </a:r>
+            <a:endParaRPr lang="ru-RU" sz="1600" dirty="0">
+              <a:solidFill>
+                <a:schemeClr val="accent2"/>
+              </a:solidFill>
+              <a:latin typeface="Segoe UI" panose="020B0502040204020203" pitchFamily="34" charset="0"/>
+              <a:cs typeface="Segoe UI" panose="020B0502040204020203" pitchFamily="34" charset="0"/>
+            </a:endParaRPr>
+          </a:p>
+        </p:txBody>
+      </p:sp>
+      <p:cxnSp>
+        <p:nvCxnSpPr>
+          <p:cNvPr id="65" name="Прямая со стрелкой 64"/>
+          <p:cNvCxnSpPr>
+            <a:stCxn id="63" idx="2"/>
+            <a:endCxn id="46" idx="0"/>
+          </p:cNvCxnSpPr>
+          <p:nvPr/>
+        </p:nvCxnSpPr>
+        <p:spPr>
+          <a:xfrm>
+            <a:off x="1852885" y="1681306"/>
+            <a:ext cx="0" cy="295652"/>
+          </a:xfrm>
+          <a:prstGeom prst="straightConnector1">
+            <a:avLst/>
+          </a:prstGeom>
+          <a:ln w="19050">
+            <a:solidFill>
+              <a:schemeClr val="accent2"/>
+            </a:solidFill>
+            <a:tailEnd type="arrow"/>
+          </a:ln>
+        </p:spPr>
+        <p:style>
+          <a:lnRef idx="1">
+            <a:schemeClr val="accent1"/>
+          </a:lnRef>
+          <a:fillRef idx="0">
+            <a:schemeClr val="accent1"/>
+          </a:fillRef>
+          <a:effectRef idx="0">
+            <a:schemeClr val="accent1"/>
+          </a:effectRef>
+          <a:fontRef idx="minor">
+            <a:schemeClr val="tx1"/>
+          </a:fontRef>
+        </p:style>
+      </p:cxnSp>
+      <p:cxnSp>
+        <p:nvCxnSpPr>
+          <p:cNvPr id="72" name="Прямая со стрелкой 71"/>
+          <p:cNvCxnSpPr>
+            <a:stCxn id="10" idx="2"/>
+            <a:endCxn id="57" idx="0"/>
+          </p:cNvCxnSpPr>
+          <p:nvPr/>
+        </p:nvCxnSpPr>
+        <p:spPr>
+          <a:xfrm>
+            <a:off x="3731388" y="1680304"/>
+            <a:ext cx="0" cy="296654"/>
+          </a:xfrm>
+          <a:prstGeom prst="straightConnector1">
+            <a:avLst/>
+          </a:prstGeom>
+          <a:ln w="19050">
+            <a:solidFill>
+              <a:schemeClr val="accent2"/>
+            </a:solidFill>
+            <a:tailEnd type="arrow"/>
+          </a:ln>
+        </p:spPr>
+        <p:style>
+          <a:lnRef idx="1">
+            <a:schemeClr val="accent1"/>
+          </a:lnRef>
+          <a:fillRef idx="0">
+            <a:schemeClr val="accent1"/>
+          </a:fillRef>
+          <a:effectRef idx="0">
+            <a:schemeClr val="accent1"/>
+          </a:effectRef>
+          <a:fontRef idx="minor">
+            <a:schemeClr val="tx1"/>
+          </a:fontRef>
+        </p:style>
+      </p:cxnSp>
+      <p:sp>
+        <p:nvSpPr>
+          <p:cNvPr id="87" name="Скругленный прямоугольник 86"/>
+          <p:cNvSpPr/>
+          <p:nvPr/>
+        </p:nvSpPr>
+        <p:spPr>
+          <a:xfrm>
+            <a:off x="3969341" y="3943626"/>
+            <a:ext cx="1651252" cy="720080"/>
+          </a:xfrm>
+          <a:prstGeom prst="roundRect">
+            <a:avLst/>
+          </a:prstGeom>
+          <a:ln/>
+          <a:effectLst>
+            <a:outerShdw blurRad="50800" dist="38100" dir="5400000" algn="t" rotWithShape="0">
+              <a:prstClr val="black">
+                <a:alpha val="40000"/>
+              </a:prstClr>
+            </a:outerShdw>
+          </a:effectLst>
+        </p:spPr>
+        <p:style>
+          <a:lnRef idx="2">
+            <a:schemeClr val="accent4"/>
+          </a:lnRef>
+          <a:fillRef idx="1">
+            <a:schemeClr val="lt1"/>
+          </a:fillRef>
+          <a:effectRef idx="0">
+            <a:schemeClr val="accent4"/>
+          </a:effectRef>
+          <a:fontRef idx="minor">
+            <a:schemeClr val="dk1"/>
+          </a:fontRef>
+        </p:style>
+        <p:txBody>
+          <a:bodyPr rtlCol="0" anchor="ctr"/>
+          <a:lstStyle/>
+          <a:p>
+            <a:pPr algn="ctr"/>
+            <a:r>
+              <a:rPr lang="en-US" sz="1400" dirty="0" err="1" smtClean="0">
+                <a:solidFill>
+                  <a:schemeClr val="accent4"/>
+                </a:solidFill>
+                <a:latin typeface="Segoe UI" panose="020B0502040204020203" pitchFamily="34" charset="0"/>
+                <a:cs typeface="Segoe UI" panose="020B0502040204020203" pitchFamily="34" charset="0"/>
+              </a:rPr>
+              <a:t>EquationFactory</a:t>
+            </a:r>
+            <a:endParaRPr lang="ru-RU" sz="1600" dirty="0">
+              <a:solidFill>
+                <a:schemeClr val="accent4"/>
+              </a:solidFill>
+              <a:latin typeface="Segoe UI" panose="020B0502040204020203" pitchFamily="34" charset="0"/>
+              <a:cs typeface="Segoe UI" panose="020B0502040204020203" pitchFamily="34" charset="0"/>
+            </a:endParaRPr>
+          </a:p>
+        </p:txBody>
+      </p:sp>
+      <p:sp>
+        <p:nvSpPr>
+          <p:cNvPr id="88" name="Цилиндр 87"/>
+          <p:cNvSpPr/>
+          <p:nvPr/>
+        </p:nvSpPr>
+        <p:spPr>
+          <a:xfrm>
+            <a:off x="5938367" y="4069640"/>
+            <a:ext cx="369178" cy="468052"/>
+          </a:xfrm>
+          <a:prstGeom prst="can">
+            <a:avLst/>
+          </a:prstGeom>
+          <a:solidFill>
+            <a:schemeClr val="accent4">
+              <a:lumMod val="40000"/>
+              <a:lumOff val="60000"/>
+            </a:schemeClr>
+          </a:solidFill>
+          <a:ln>
+            <a:solidFill>
+              <a:schemeClr val="accent4"/>
+            </a:solidFill>
+          </a:ln>
+        </p:spPr>
+        <p:style>
+          <a:lnRef idx="2">
+            <a:schemeClr val="accent1">
+              <a:shade val="50000"/>
+            </a:schemeClr>
+          </a:lnRef>
+          <a:fillRef idx="1">
+            <a:schemeClr val="accent1"/>
+          </a:fillRef>
+          <a:effectRef idx="0">
+            <a:schemeClr val="accent1"/>
+          </a:effectRef>
+          <a:fontRef idx="minor">
+            <a:schemeClr val="lt1"/>
+          </a:fontRef>
+        </p:style>
+        <p:txBody>
+          <a:bodyPr rtlCol="0" anchor="ctr"/>
+          <a:lstStyle/>
+          <a:p>
+            <a:pPr algn="ctr"/>
+            <a:r>
+              <a:rPr lang="ru-RU" sz="700" dirty="0" err="1" smtClean="0">
+                <a:latin typeface="Segoe UI" panose="020B0502040204020203" pitchFamily="34" charset="0"/>
+                <a:cs typeface="Segoe UI" panose="020B0502040204020203" pitchFamily="34" charset="0"/>
+              </a:rPr>
+              <a:t>Реш</a:t>
+            </a:r>
+            <a:r>
+              <a:rPr lang="ru-RU" sz="700" dirty="0" smtClean="0">
+                <a:latin typeface="Segoe UI" panose="020B0502040204020203" pitchFamily="34" charset="0"/>
+                <a:cs typeface="Segoe UI" panose="020B0502040204020203" pitchFamily="34" charset="0"/>
+              </a:rPr>
+              <a:t>.</a:t>
+            </a:r>
+            <a:endParaRPr lang="ru-RU" sz="700" dirty="0">
+              <a:latin typeface="Segoe UI" panose="020B0502040204020203" pitchFamily="34" charset="0"/>
+              <a:cs typeface="Segoe UI" panose="020B0502040204020203" pitchFamily="34" charset="0"/>
+            </a:endParaRPr>
+          </a:p>
+        </p:txBody>
+      </p:sp>
+      <p:sp>
+        <p:nvSpPr>
+          <p:cNvPr id="89" name="Цилиндр 88"/>
+          <p:cNvSpPr/>
+          <p:nvPr/>
+        </p:nvSpPr>
+        <p:spPr>
+          <a:xfrm>
+            <a:off x="6554423" y="4069640"/>
+            <a:ext cx="369178" cy="468052"/>
+          </a:xfrm>
+          <a:prstGeom prst="can">
+            <a:avLst/>
+          </a:prstGeom>
+          <a:solidFill>
+            <a:schemeClr val="accent4">
+              <a:lumMod val="60000"/>
+              <a:lumOff val="40000"/>
+            </a:schemeClr>
+          </a:solidFill>
+          <a:ln>
+            <a:solidFill>
+              <a:schemeClr val="accent4"/>
+            </a:solidFill>
+          </a:ln>
+        </p:spPr>
+        <p:style>
+          <a:lnRef idx="2">
+            <a:schemeClr val="accent1">
+              <a:shade val="50000"/>
+            </a:schemeClr>
+          </a:lnRef>
+          <a:fillRef idx="1">
+            <a:schemeClr val="accent1"/>
+          </a:fillRef>
+          <a:effectRef idx="0">
+            <a:schemeClr val="accent1"/>
+          </a:effectRef>
+          <a:fontRef idx="minor">
+            <a:schemeClr val="lt1"/>
+          </a:fontRef>
+        </p:style>
+        <p:txBody>
+          <a:bodyPr rtlCol="0" anchor="ctr"/>
+          <a:lstStyle/>
+          <a:p>
+            <a:pPr algn="ctr"/>
+            <a:r>
+              <a:rPr lang="ru-RU" sz="700" dirty="0" err="1" smtClean="0">
+                <a:latin typeface="Segoe UI" panose="020B0502040204020203" pitchFamily="34" charset="0"/>
+                <a:cs typeface="Segoe UI" panose="020B0502040204020203" pitchFamily="34" charset="0"/>
+              </a:rPr>
+              <a:t>Реш</a:t>
+            </a:r>
+            <a:r>
+              <a:rPr lang="ru-RU" sz="700" dirty="0" smtClean="0">
+                <a:latin typeface="Segoe UI" panose="020B0502040204020203" pitchFamily="34" charset="0"/>
+                <a:cs typeface="Segoe UI" panose="020B0502040204020203" pitchFamily="34" charset="0"/>
+              </a:rPr>
+              <a:t>.</a:t>
+            </a:r>
+            <a:endParaRPr lang="ru-RU" sz="700" dirty="0">
+              <a:latin typeface="Segoe UI" panose="020B0502040204020203" pitchFamily="34" charset="0"/>
+              <a:cs typeface="Segoe UI" panose="020B0502040204020203" pitchFamily="34" charset="0"/>
+            </a:endParaRPr>
+          </a:p>
+        </p:txBody>
+      </p:sp>
+      <p:sp>
+        <p:nvSpPr>
+          <p:cNvPr id="90" name="Цилиндр 89"/>
+          <p:cNvSpPr/>
+          <p:nvPr/>
+        </p:nvSpPr>
+        <p:spPr>
+          <a:xfrm>
+            <a:off x="7204769" y="4072724"/>
+            <a:ext cx="369178" cy="468052"/>
+          </a:xfrm>
+          <a:prstGeom prst="can">
+            <a:avLst/>
+          </a:prstGeom>
+          <a:solidFill>
+            <a:schemeClr val="accent4">
+              <a:lumMod val="60000"/>
+              <a:lumOff val="40000"/>
+            </a:schemeClr>
+          </a:solidFill>
+          <a:ln>
+            <a:solidFill>
+              <a:schemeClr val="accent4"/>
+            </a:solidFill>
+          </a:ln>
+        </p:spPr>
+        <p:style>
+          <a:lnRef idx="2">
+            <a:schemeClr val="accent1">
+              <a:shade val="50000"/>
+            </a:schemeClr>
+          </a:lnRef>
+          <a:fillRef idx="1">
+            <a:schemeClr val="accent1"/>
+          </a:fillRef>
+          <a:effectRef idx="0">
+            <a:schemeClr val="accent1"/>
+          </a:effectRef>
+          <a:fontRef idx="minor">
+            <a:schemeClr val="lt1"/>
+          </a:fontRef>
+        </p:style>
+        <p:txBody>
+          <a:bodyPr rtlCol="0" anchor="ctr"/>
+          <a:lstStyle/>
+          <a:p>
+            <a:pPr algn="ctr"/>
+            <a:r>
+              <a:rPr lang="ru-RU" sz="700" dirty="0" err="1" smtClean="0">
+                <a:latin typeface="Segoe UI" panose="020B0502040204020203" pitchFamily="34" charset="0"/>
+                <a:cs typeface="Segoe UI" panose="020B0502040204020203" pitchFamily="34" charset="0"/>
+              </a:rPr>
+              <a:t>Реш</a:t>
+            </a:r>
+            <a:r>
+              <a:rPr lang="ru-RU" sz="700" dirty="0">
+                <a:latin typeface="Segoe UI" panose="020B0502040204020203" pitchFamily="34" charset="0"/>
+                <a:cs typeface="Segoe UI" panose="020B0502040204020203" pitchFamily="34" charset="0"/>
+              </a:rPr>
+              <a:t>.</a:t>
+            </a:r>
+          </a:p>
+        </p:txBody>
+      </p:sp>
+      <p:cxnSp>
+        <p:nvCxnSpPr>
+          <p:cNvPr id="92" name="Прямая со стрелкой 91"/>
+          <p:cNvCxnSpPr>
+            <a:stCxn id="88" idx="2"/>
+          </p:cNvCxnSpPr>
+          <p:nvPr/>
+        </p:nvCxnSpPr>
+        <p:spPr>
+          <a:xfrm flipH="1">
+            <a:off x="5648921" y="4303666"/>
+            <a:ext cx="289446" cy="0"/>
+          </a:xfrm>
+          <a:prstGeom prst="straightConnector1">
+            <a:avLst/>
+          </a:prstGeom>
+          <a:ln w="12700">
+            <a:solidFill>
+              <a:schemeClr val="accent4"/>
+            </a:solidFill>
+            <a:tailEnd type="arrow"/>
+          </a:ln>
+        </p:spPr>
+        <p:style>
+          <a:lnRef idx="1">
+            <a:schemeClr val="accent1"/>
+          </a:lnRef>
+          <a:fillRef idx="0">
+            <a:schemeClr val="accent1"/>
+          </a:fillRef>
+          <a:effectRef idx="0">
+            <a:schemeClr val="accent1"/>
+          </a:effectRef>
+          <a:fontRef idx="minor">
+            <a:schemeClr val="tx1"/>
+          </a:fontRef>
+        </p:style>
+      </p:cxnSp>
+      <p:cxnSp>
+        <p:nvCxnSpPr>
+          <p:cNvPr id="93" name="Прямая со стрелкой 92"/>
+          <p:cNvCxnSpPr>
+            <a:endCxn id="88" idx="4"/>
+          </p:cNvCxnSpPr>
+          <p:nvPr/>
+        </p:nvCxnSpPr>
+        <p:spPr>
+          <a:xfrm flipH="1">
+            <a:off x="6307545" y="4303666"/>
+            <a:ext cx="275206" cy="0"/>
+          </a:xfrm>
+          <a:prstGeom prst="straightConnector1">
+            <a:avLst/>
+          </a:prstGeom>
+          <a:ln w="12700">
+            <a:solidFill>
+              <a:schemeClr val="accent4"/>
+            </a:solidFill>
+            <a:tailEnd type="arrow"/>
+          </a:ln>
+        </p:spPr>
+        <p:style>
+          <a:lnRef idx="1">
+            <a:schemeClr val="accent1"/>
+          </a:lnRef>
+          <a:fillRef idx="0">
+            <a:schemeClr val="accent1"/>
+          </a:fillRef>
+          <a:effectRef idx="0">
+            <a:schemeClr val="accent1"/>
+          </a:effectRef>
+          <a:fontRef idx="minor">
+            <a:schemeClr val="tx1"/>
+          </a:fontRef>
+        </p:style>
+      </p:cxnSp>
+      <p:cxnSp>
+        <p:nvCxnSpPr>
+          <p:cNvPr id="97" name="Прямая со стрелкой 96"/>
+          <p:cNvCxnSpPr>
+            <a:stCxn id="90" idx="2"/>
+            <a:endCxn id="89" idx="4"/>
+          </p:cNvCxnSpPr>
+          <p:nvPr/>
+        </p:nvCxnSpPr>
+        <p:spPr>
+          <a:xfrm flipH="1" flipV="1">
+            <a:off x="6923601" y="4303666"/>
+            <a:ext cx="281168" cy="3084"/>
+          </a:xfrm>
+          <a:prstGeom prst="straightConnector1">
+            <a:avLst/>
+          </a:prstGeom>
+          <a:ln w="12700">
+            <a:solidFill>
+              <a:schemeClr val="accent4"/>
+            </a:solidFill>
+            <a:tailEnd type="arrow"/>
+          </a:ln>
+        </p:spPr>
+        <p:style>
+          <a:lnRef idx="1">
+            <a:schemeClr val="accent1"/>
+          </a:lnRef>
+          <a:fillRef idx="0">
+            <a:schemeClr val="accent1"/>
+          </a:fillRef>
+          <a:effectRef idx="0">
+            <a:schemeClr val="accent1"/>
+          </a:effectRef>
+          <a:fontRef idx="minor">
+            <a:schemeClr val="tx1"/>
+          </a:fontRef>
+        </p:style>
+      </p:cxnSp>
     </p:spTree>
     <p:extLst>
       <p:ext uri="{BB962C8B-B14F-4D97-AF65-F5344CB8AC3E}">
@@ -9941,7 +10972,7 @@
                                           </p:stCondLst>
                                         </p:cTn>
                                         <p:tgtEl>
-                                          <p:spTgt spid="5"/>
+                                          <p:spTgt spid="10"/>
                                         </p:tgtEl>
                                         <p:attrNameLst>
                                           <p:attrName>style.visibility</p:attrName>
@@ -9955,7 +10986,7 @@
                                       <p:cBhvr>
                                         <p:cTn id="7" dur="500"/>
                                         <p:tgtEl>
-                                          <p:spTgt spid="5"/>
+                                          <p:spTgt spid="10"/>
                                         </p:tgtEl>
                                       </p:cBhvr>
                                     </p:animEffect>
@@ -9976,7 +11007,7 @@
                                           </p:stCondLst>
                                         </p:cTn>
                                         <p:tgtEl>
-                                          <p:spTgt spid="10"/>
+                                          <p:spTgt spid="5"/>
                                         </p:tgtEl>
                                         <p:attrNameLst>
                                           <p:attrName>style.visibility</p:attrName>
@@ -9990,40 +11021,22 @@
                                       <p:cBhvr>
                                         <p:cTn id="10" dur="500"/>
                                         <p:tgtEl>
-                                          <p:spTgt spid="10"/>
+                                          <p:spTgt spid="5"/>
                                         </p:tgtEl>
                                       </p:cBhvr>
                                     </p:animEffect>
                                   </p:childTnLst>
                                 </p:cTn>
                               </p:par>
-                            </p:childTnLst>
-                          </p:cTn>
-                        </p:par>
-                      </p:childTnLst>
-                    </p:cTn>
-                  </p:par>
-                  <p:par>
-                    <p:cTn id="11" fill="hold">
-                      <p:stCondLst>
-                        <p:cond delay="indefinite"/>
-                      </p:stCondLst>
-                      <p:childTnLst>
-                        <p:par>
-                          <p:cTn id="12" fill="hold">
-                            <p:stCondLst>
-                              <p:cond delay="0"/>
-                            </p:stCondLst>
-                            <p:childTnLst>
                               <p:par>
-                                <p:cTn id="13" presetID="10" presetClass="entr" presetSubtype="0" fill="hold" nodeType="clickEffect">
+                                <p:cTn id="11" presetID="10" presetClass="entr" presetSubtype="0" fill="hold" nodeType="withEffect">
                                   <p:stCondLst>
                                     <p:cond delay="0"/>
                                   </p:stCondLst>
                                   <p:childTnLst>
                                     <p:set>
                                       <p:cBhvr>
-                                        <p:cTn id="14" dur="1" fill="hold">
+                                        <p:cTn id="12" dur="1" fill="hold">
                                           <p:stCondLst>
                                             <p:cond delay="0"/>
                                           </p:stCondLst>
@@ -10041,7 +11054,7 @@
                                     </p:set>
                                     <p:animEffect transition="in" filter="fade">
                                       <p:cBhvr>
-                                        <p:cTn id="15" dur="500"/>
+                                        <p:cTn id="13" dur="500"/>
                                         <p:tgtEl>
                                           <p:spTgt spid="14"/>
                                         </p:tgtEl>
@@ -10051,14 +11064,14 @@
                                 </p:cTn>
                               </p:par>
                               <p:par>
-                                <p:cTn id="16" presetID="10" presetClass="entr" presetSubtype="0" fill="hold" nodeType="withEffect">
+                                <p:cTn id="14" presetID="1" presetClass="entr" presetSubtype="0" fill="hold" nodeType="withEffect">
                                   <p:stCondLst>
                                     <p:cond delay="0"/>
                                   </p:stCondLst>
                                   <p:childTnLst>
                                     <p:set>
                                       <p:cBhvr>
-                                        <p:cTn id="17" dur="1" fill="hold">
+                                        <p:cTn id="15" dur="1" fill="hold">
                                           <p:stCondLst>
                                             <p:cond delay="0"/>
                                           </p:stCondLst>
@@ -10074,26 +11087,18 @@
                                         <p:strVal val="visible"/>
                                       </p:to>
                                     </p:set>
-                                    <p:animEffect transition="in" filter="fade">
-                                      <p:cBhvr>
-                                        <p:cTn id="18" dur="500"/>
-                                        <p:tgtEl>
-                                          <p:spTgt spid="16"/>
-                                        </p:tgtEl>
-                                      </p:cBhvr>
-                                    </p:animEffect>
                                   </p:childTnLst>
                                 </p:cTn>
                               </p:par>
                               <p:par>
-                                <p:cTn id="19" presetID="10" presetClass="entr" presetSubtype="0" fill="hold" nodeType="withEffect">
+                                <p:cTn id="16" presetID="1" presetClass="entr" presetSubtype="0" fill="hold" nodeType="withEffect">
                                   <p:stCondLst>
                                     <p:cond delay="0"/>
                                   </p:stCondLst>
                                   <p:childTnLst>
                                     <p:set>
                                       <p:cBhvr>
-                                        <p:cTn id="20" dur="1" fill="hold">
+                                        <p:cTn id="17" dur="1" fill="hold">
                                           <p:stCondLst>
                                             <p:cond delay="0"/>
                                           </p:stCondLst>
@@ -10109,26 +11114,36 @@
                                         <p:strVal val="visible"/>
                                       </p:to>
                                     </p:set>
-                                    <p:animEffect transition="in" filter="fade">
-                                      <p:cBhvr>
-                                        <p:cTn id="21" dur="500"/>
-                                        <p:tgtEl>
-                                          <p:spTgt spid="18"/>
-                                        </p:tgtEl>
-                                      </p:cBhvr>
-                                    </p:animEffect>
                                   </p:childTnLst>
                                 </p:cTn>
                               </p:par>
+                            </p:childTnLst>
+                          </p:cTn>
+                        </p:par>
+                      </p:childTnLst>
+                    </p:cTn>
+                  </p:par>
+                  <p:par>
+                    <p:cTn id="18" fill="hold">
+                      <p:stCondLst>
+                        <p:cond delay="indefinite"/>
+                      </p:stCondLst>
+                      <p:childTnLst>
+                        <p:par>
+                          <p:cTn id="19" fill="hold">
+                            <p:stCondLst>
+                              <p:cond delay="0"/>
+                            </p:stCondLst>
+                            <p:childTnLst>
                               <p:par>
-                                <p:cTn id="22" presetID="10" presetClass="entr" presetSubtype="0" fill="hold" grpId="0" nodeType="withEffect">
+                                <p:cTn id="20" presetID="10" presetClass="entr" presetSubtype="0" fill="hold" grpId="0" nodeType="clickEffect">
                                   <p:stCondLst>
                                     <p:cond delay="0"/>
                                   </p:stCondLst>
                                   <p:childTnLst>
                                     <p:set>
                                       <p:cBhvr>
-                                        <p:cTn id="23" dur="1" fill="hold">
+                                        <p:cTn id="21" dur="1" fill="hold">
                                           <p:stCondLst>
                                             <p:cond delay="0"/>
                                           </p:stCondLst>
@@ -10146,7 +11161,7 @@
                                     </p:set>
                                     <p:animEffect transition="in" filter="fade">
                                       <p:cBhvr>
-                                        <p:cTn id="24" dur="500"/>
+                                        <p:cTn id="22" dur="500"/>
                                         <p:tgtEl>
                                           <p:spTgt spid="6"/>
                                         </p:tgtEl>
@@ -10156,14 +11171,14 @@
                                 </p:cTn>
                               </p:par>
                               <p:par>
-                                <p:cTn id="25" presetID="10" presetClass="entr" presetSubtype="0" fill="hold" grpId="0" nodeType="withEffect">
+                                <p:cTn id="23" presetID="10" presetClass="entr" presetSubtype="0" fill="hold" grpId="0" nodeType="withEffect">
                                   <p:stCondLst>
                                     <p:cond delay="0"/>
                                   </p:stCondLst>
                                   <p:childTnLst>
                                     <p:set>
                                       <p:cBhvr>
-                                        <p:cTn id="26" dur="1" fill="hold">
+                                        <p:cTn id="24" dur="1" fill="hold">
                                           <p:stCondLst>
                                             <p:cond delay="0"/>
                                           </p:stCondLst>
@@ -10181,7 +11196,7 @@
                                     </p:set>
                                     <p:animEffect transition="in" filter="fade">
                                       <p:cBhvr>
-                                        <p:cTn id="27" dur="500"/>
+                                        <p:cTn id="25" dur="500"/>
                                         <p:tgtEl>
                                           <p:spTgt spid="25"/>
                                         </p:tgtEl>
@@ -10191,14 +11206,14 @@
                                 </p:cTn>
                               </p:par>
                               <p:par>
-                                <p:cTn id="28" presetID="10" presetClass="entr" presetSubtype="0" fill="hold" grpId="0" nodeType="withEffect">
+                                <p:cTn id="26" presetID="10" presetClass="entr" presetSubtype="0" fill="hold" grpId="0" nodeType="withEffect">
                                   <p:stCondLst>
                                     <p:cond delay="0"/>
                                   </p:stCondLst>
                                   <p:childTnLst>
                                     <p:set>
                                       <p:cBhvr>
-                                        <p:cTn id="29" dur="1" fill="hold">
+                                        <p:cTn id="27" dur="1" fill="hold">
                                           <p:stCondLst>
                                             <p:cond delay="0"/>
                                           </p:stCondLst>
@@ -10216,7 +11231,7 @@
                                     </p:set>
                                     <p:animEffect transition="in" filter="fade">
                                       <p:cBhvr>
-                                        <p:cTn id="30" dur="500"/>
+                                        <p:cTn id="28" dur="500"/>
                                         <p:tgtEl>
                                           <p:spTgt spid="20"/>
                                         </p:tgtEl>
@@ -10232,26 +11247,26 @@
                     </p:cTn>
                   </p:par>
                   <p:par>
-                    <p:cTn id="31" fill="hold">
+                    <p:cTn id="29" fill="hold">
                       <p:stCondLst>
                         <p:cond delay="indefinite"/>
                       </p:stCondLst>
                       <p:childTnLst>
                         <p:par>
-                          <p:cTn id="32" fill="hold">
+                          <p:cTn id="30" fill="hold">
                             <p:stCondLst>
                               <p:cond delay="0"/>
                             </p:stCondLst>
                             <p:childTnLst>
                               <p:par>
-                                <p:cTn id="33" presetID="10" presetClass="entr" presetSubtype="0" fill="hold" nodeType="clickEffect">
+                                <p:cTn id="31" presetID="10" presetClass="entr" presetSubtype="0" fill="hold" nodeType="clickEffect">
                                   <p:stCondLst>
                                     <p:cond delay="0"/>
                                   </p:stCondLst>
                                   <p:childTnLst>
                                     <p:set>
                                       <p:cBhvr>
-                                        <p:cTn id="34" dur="1" fill="hold">
+                                        <p:cTn id="32" dur="1" fill="hold">
                                           <p:stCondLst>
                                             <p:cond delay="0"/>
                                           </p:stCondLst>
@@ -10269,7 +11284,7 @@
                                     </p:set>
                                     <p:animEffect transition="in" filter="fade">
                                       <p:cBhvr>
-                                        <p:cTn id="35" dur="500"/>
+                                        <p:cTn id="33" dur="500"/>
                                         <p:tgtEl>
                                           <p:spTgt spid="27"/>
                                         </p:tgtEl>
@@ -10279,14 +11294,14 @@
                                 </p:cTn>
                               </p:par>
                               <p:par>
-                                <p:cTn id="36" presetID="10" presetClass="entr" presetSubtype="0" fill="hold" grpId="0" nodeType="withEffect">
+                                <p:cTn id="34" presetID="10" presetClass="entr" presetSubtype="0" fill="hold" grpId="0" nodeType="withEffect">
                                   <p:stCondLst>
                                     <p:cond delay="0"/>
                                   </p:stCondLst>
                                   <p:childTnLst>
                                     <p:set>
                                       <p:cBhvr>
-                                        <p:cTn id="37" dur="1" fill="hold">
+                                        <p:cTn id="35" dur="1" fill="hold">
                                           <p:stCondLst>
                                             <p:cond delay="0"/>
                                           </p:stCondLst>
@@ -10304,7 +11319,7 @@
                                     </p:set>
                                     <p:animEffect transition="in" filter="fade">
                                       <p:cBhvr>
-                                        <p:cTn id="38" dur="500"/>
+                                        <p:cTn id="36" dur="500"/>
                                         <p:tgtEl>
                                           <p:spTgt spid="7"/>
                                         </p:tgtEl>
@@ -10320,26 +11335,641 @@
                     </p:cTn>
                   </p:par>
                   <p:par>
-                    <p:cTn id="39" fill="hold">
+                    <p:cTn id="37" fill="hold">
                       <p:stCondLst>
                         <p:cond delay="indefinite"/>
                       </p:stCondLst>
                       <p:childTnLst>
                         <p:par>
-                          <p:cTn id="40" fill="hold">
+                          <p:cTn id="38" fill="hold">
                             <p:stCondLst>
                               <p:cond delay="0"/>
                             </p:stCondLst>
                             <p:childTnLst>
                               <p:par>
-                                <p:cTn id="41" presetID="10" presetClass="entr" presetSubtype="0" fill="hold" nodeType="clickEffect">
+                                <p:cTn id="39" presetID="10" presetClass="exit" presetSubtype="0" fill="hold" grpId="1" nodeType="clickEffect">
+                                  <p:stCondLst>
+                                    <p:cond delay="0"/>
+                                  </p:stCondLst>
+                                  <p:childTnLst>
+                                    <p:animEffect transition="out" filter="fade">
+                                      <p:cBhvr>
+                                        <p:cTn id="40" dur="500"/>
+                                        <p:tgtEl>
+                                          <p:spTgt spid="5"/>
+                                        </p:tgtEl>
+                                      </p:cBhvr>
+                                    </p:animEffect>
+                                    <p:set>
+                                      <p:cBhvr>
+                                        <p:cTn id="41" dur="1" fill="hold">
+                                          <p:stCondLst>
+                                            <p:cond delay="499"/>
+                                          </p:stCondLst>
+                                        </p:cTn>
+                                        <p:tgtEl>
+                                          <p:spTgt spid="5"/>
+                                        </p:tgtEl>
+                                        <p:attrNameLst>
+                                          <p:attrName>style.visibility</p:attrName>
+                                        </p:attrNameLst>
+                                      </p:cBhvr>
+                                      <p:to>
+                                        <p:strVal val="hidden"/>
+                                      </p:to>
+                                    </p:set>
+                                  </p:childTnLst>
+                                </p:cTn>
+                              </p:par>
+                              <p:par>
+                                <p:cTn id="42" presetID="10" presetClass="exit" presetSubtype="0" fill="hold" nodeType="withEffect">
+                                  <p:stCondLst>
+                                    <p:cond delay="0"/>
+                                  </p:stCondLst>
+                                  <p:childTnLst>
+                                    <p:animEffect transition="out" filter="fade">
+                                      <p:cBhvr>
+                                        <p:cTn id="43" dur="500"/>
+                                        <p:tgtEl>
+                                          <p:spTgt spid="14"/>
+                                        </p:tgtEl>
+                                      </p:cBhvr>
+                                    </p:animEffect>
+                                    <p:set>
+                                      <p:cBhvr>
+                                        <p:cTn id="44" dur="1" fill="hold">
+                                          <p:stCondLst>
+                                            <p:cond delay="499"/>
+                                          </p:stCondLst>
+                                        </p:cTn>
+                                        <p:tgtEl>
+                                          <p:spTgt spid="14"/>
+                                        </p:tgtEl>
+                                        <p:attrNameLst>
+                                          <p:attrName>style.visibility</p:attrName>
+                                        </p:attrNameLst>
+                                      </p:cBhvr>
+                                      <p:to>
+                                        <p:strVal val="hidden"/>
+                                      </p:to>
+                                    </p:set>
+                                  </p:childTnLst>
+                                </p:cTn>
+                              </p:par>
+                              <p:par>
+                                <p:cTn id="45" presetID="10" presetClass="exit" presetSubtype="0" fill="hold" nodeType="withEffect">
+                                  <p:stCondLst>
+                                    <p:cond delay="0"/>
+                                  </p:stCondLst>
+                                  <p:childTnLst>
+                                    <p:animEffect transition="out" filter="fade">
+                                      <p:cBhvr>
+                                        <p:cTn id="46" dur="500"/>
+                                        <p:tgtEl>
+                                          <p:spTgt spid="18"/>
+                                        </p:tgtEl>
+                                      </p:cBhvr>
+                                    </p:animEffect>
+                                    <p:set>
+                                      <p:cBhvr>
+                                        <p:cTn id="47" dur="1" fill="hold">
+                                          <p:stCondLst>
+                                            <p:cond delay="499"/>
+                                          </p:stCondLst>
+                                        </p:cTn>
+                                        <p:tgtEl>
+                                          <p:spTgt spid="18"/>
+                                        </p:tgtEl>
+                                        <p:attrNameLst>
+                                          <p:attrName>style.visibility</p:attrName>
+                                        </p:attrNameLst>
+                                      </p:cBhvr>
+                                      <p:to>
+                                        <p:strVal val="hidden"/>
+                                      </p:to>
+                                    </p:set>
+                                  </p:childTnLst>
+                                </p:cTn>
+                              </p:par>
+                              <p:par>
+                                <p:cTn id="48" presetID="10" presetClass="exit" presetSubtype="0" fill="hold" nodeType="withEffect">
+                                  <p:stCondLst>
+                                    <p:cond delay="0"/>
+                                  </p:stCondLst>
+                                  <p:childTnLst>
+                                    <p:animEffect transition="out" filter="fade">
+                                      <p:cBhvr>
+                                        <p:cTn id="49" dur="500"/>
+                                        <p:tgtEl>
+                                          <p:spTgt spid="16"/>
+                                        </p:tgtEl>
+                                      </p:cBhvr>
+                                    </p:animEffect>
+                                    <p:set>
+                                      <p:cBhvr>
+                                        <p:cTn id="50" dur="1" fill="hold">
+                                          <p:stCondLst>
+                                            <p:cond delay="499"/>
+                                          </p:stCondLst>
+                                        </p:cTn>
+                                        <p:tgtEl>
+                                          <p:spTgt spid="16"/>
+                                        </p:tgtEl>
+                                        <p:attrNameLst>
+                                          <p:attrName>style.visibility</p:attrName>
+                                        </p:attrNameLst>
+                                      </p:cBhvr>
+                                      <p:to>
+                                        <p:strVal val="hidden"/>
+                                      </p:to>
+                                    </p:set>
+                                  </p:childTnLst>
+                                </p:cTn>
+                              </p:par>
+                            </p:childTnLst>
+                          </p:cTn>
+                        </p:par>
+                      </p:childTnLst>
+                    </p:cTn>
+                  </p:par>
+                  <p:par>
+                    <p:cTn id="51" fill="hold">
+                      <p:stCondLst>
+                        <p:cond delay="indefinite"/>
+                      </p:stCondLst>
+                      <p:childTnLst>
+                        <p:par>
+                          <p:cTn id="52" fill="hold">
+                            <p:stCondLst>
+                              <p:cond delay="0"/>
+                            </p:stCondLst>
+                            <p:childTnLst>
+                              <p:par>
+                                <p:cTn id="53" presetID="10" presetClass="exit" presetSubtype="0" fill="hold" grpId="1" nodeType="clickEffect">
+                                  <p:stCondLst>
+                                    <p:cond delay="0"/>
+                                  </p:stCondLst>
+                                  <p:childTnLst>
+                                    <p:animEffect transition="out" filter="fade">
+                                      <p:cBhvr>
+                                        <p:cTn id="54" dur="500"/>
+                                        <p:tgtEl>
+                                          <p:spTgt spid="6"/>
+                                        </p:tgtEl>
+                                      </p:cBhvr>
+                                    </p:animEffect>
+                                    <p:set>
+                                      <p:cBhvr>
+                                        <p:cTn id="55" dur="1" fill="hold">
+                                          <p:stCondLst>
+                                            <p:cond delay="499"/>
+                                          </p:stCondLst>
+                                        </p:cTn>
+                                        <p:tgtEl>
+                                          <p:spTgt spid="6"/>
+                                        </p:tgtEl>
+                                        <p:attrNameLst>
+                                          <p:attrName>style.visibility</p:attrName>
+                                        </p:attrNameLst>
+                                      </p:cBhvr>
+                                      <p:to>
+                                        <p:strVal val="hidden"/>
+                                      </p:to>
+                                    </p:set>
+                                  </p:childTnLst>
+                                </p:cTn>
+                              </p:par>
+                              <p:par>
+                                <p:cTn id="56" presetID="10" presetClass="exit" presetSubtype="0" fill="hold" grpId="1" nodeType="withEffect">
+                                  <p:stCondLst>
+                                    <p:cond delay="0"/>
+                                  </p:stCondLst>
+                                  <p:childTnLst>
+                                    <p:animEffect transition="out" filter="fade">
+                                      <p:cBhvr>
+                                        <p:cTn id="57" dur="500"/>
+                                        <p:tgtEl>
+                                          <p:spTgt spid="25"/>
+                                        </p:tgtEl>
+                                      </p:cBhvr>
+                                    </p:animEffect>
+                                    <p:set>
+                                      <p:cBhvr>
+                                        <p:cTn id="58" dur="1" fill="hold">
+                                          <p:stCondLst>
+                                            <p:cond delay="499"/>
+                                          </p:stCondLst>
+                                        </p:cTn>
+                                        <p:tgtEl>
+                                          <p:spTgt spid="25"/>
+                                        </p:tgtEl>
+                                        <p:attrNameLst>
+                                          <p:attrName>style.visibility</p:attrName>
+                                        </p:attrNameLst>
+                                      </p:cBhvr>
+                                      <p:to>
+                                        <p:strVal val="hidden"/>
+                                      </p:to>
+                                    </p:set>
+                                  </p:childTnLst>
+                                </p:cTn>
+                              </p:par>
+                              <p:par>
+                                <p:cTn id="59" presetID="10" presetClass="exit" presetSubtype="0" fill="hold" grpId="1" nodeType="withEffect">
+                                  <p:stCondLst>
+                                    <p:cond delay="0"/>
+                                  </p:stCondLst>
+                                  <p:childTnLst>
+                                    <p:animEffect transition="out" filter="fade">
+                                      <p:cBhvr>
+                                        <p:cTn id="60" dur="500"/>
+                                        <p:tgtEl>
+                                          <p:spTgt spid="20"/>
+                                        </p:tgtEl>
+                                      </p:cBhvr>
+                                    </p:animEffect>
+                                    <p:set>
+                                      <p:cBhvr>
+                                        <p:cTn id="61" dur="1" fill="hold">
+                                          <p:stCondLst>
+                                            <p:cond delay="499"/>
+                                          </p:stCondLst>
+                                        </p:cTn>
+                                        <p:tgtEl>
+                                          <p:spTgt spid="20"/>
+                                        </p:tgtEl>
+                                        <p:attrNameLst>
+                                          <p:attrName>style.visibility</p:attrName>
+                                        </p:attrNameLst>
+                                      </p:cBhvr>
+                                      <p:to>
+                                        <p:strVal val="hidden"/>
+                                      </p:to>
+                                    </p:set>
+                                  </p:childTnLst>
+                                </p:cTn>
+                              </p:par>
+                              <p:par>
+                                <p:cTn id="62" presetID="10" presetClass="exit" presetSubtype="0" fill="hold" nodeType="withEffect">
+                                  <p:stCondLst>
+                                    <p:cond delay="0"/>
+                                  </p:stCondLst>
+                                  <p:childTnLst>
+                                    <p:animEffect transition="out" filter="fade">
+                                      <p:cBhvr>
+                                        <p:cTn id="63" dur="500"/>
+                                        <p:tgtEl>
+                                          <p:spTgt spid="27"/>
+                                        </p:tgtEl>
+                                      </p:cBhvr>
+                                    </p:animEffect>
+                                    <p:set>
+                                      <p:cBhvr>
+                                        <p:cTn id="64" dur="1" fill="hold">
+                                          <p:stCondLst>
+                                            <p:cond delay="499"/>
+                                          </p:stCondLst>
+                                        </p:cTn>
+                                        <p:tgtEl>
+                                          <p:spTgt spid="27"/>
+                                        </p:tgtEl>
+                                        <p:attrNameLst>
+                                          <p:attrName>style.visibility</p:attrName>
+                                        </p:attrNameLst>
+                                      </p:cBhvr>
+                                      <p:to>
+                                        <p:strVal val="hidden"/>
+                                      </p:to>
+                                    </p:set>
+                                  </p:childTnLst>
+                                </p:cTn>
+                              </p:par>
+                            </p:childTnLst>
+                          </p:cTn>
+                        </p:par>
+                      </p:childTnLst>
+                    </p:cTn>
+                  </p:par>
+                  <p:par>
+                    <p:cTn id="65" fill="hold">
+                      <p:stCondLst>
+                        <p:cond delay="indefinite"/>
+                      </p:stCondLst>
+                      <p:childTnLst>
+                        <p:par>
+                          <p:cTn id="66" fill="hold">
+                            <p:stCondLst>
+                              <p:cond delay="0"/>
+                            </p:stCondLst>
+                            <p:childTnLst>
+                              <p:par>
+                                <p:cTn id="67" presetID="10" presetClass="entr" presetSubtype="0" fill="hold" grpId="0" nodeType="clickEffect">
                                   <p:stCondLst>
                                     <p:cond delay="0"/>
                                   </p:stCondLst>
                                   <p:childTnLst>
                                     <p:set>
                                       <p:cBhvr>
-                                        <p:cTn id="42" dur="1" fill="hold">
+                                        <p:cTn id="68" dur="1" fill="hold">
+                                          <p:stCondLst>
+                                            <p:cond delay="0"/>
+                                          </p:stCondLst>
+                                        </p:cTn>
+                                        <p:tgtEl>
+                                          <p:spTgt spid="63"/>
+                                        </p:tgtEl>
+                                        <p:attrNameLst>
+                                          <p:attrName>style.visibility</p:attrName>
+                                        </p:attrNameLst>
+                                      </p:cBhvr>
+                                      <p:to>
+                                        <p:strVal val="visible"/>
+                                      </p:to>
+                                    </p:set>
+                                    <p:animEffect transition="in" filter="fade">
+                                      <p:cBhvr>
+                                        <p:cTn id="69" dur="500"/>
+                                        <p:tgtEl>
+                                          <p:spTgt spid="63"/>
+                                        </p:tgtEl>
+                                      </p:cBhvr>
+                                    </p:animEffect>
+                                  </p:childTnLst>
+                                </p:cTn>
+                              </p:par>
+                            </p:childTnLst>
+                          </p:cTn>
+                        </p:par>
+                      </p:childTnLst>
+                    </p:cTn>
+                  </p:par>
+                  <p:par>
+                    <p:cTn id="70" fill="hold">
+                      <p:stCondLst>
+                        <p:cond delay="indefinite"/>
+                      </p:stCondLst>
+                      <p:childTnLst>
+                        <p:par>
+                          <p:cTn id="71" fill="hold">
+                            <p:stCondLst>
+                              <p:cond delay="0"/>
+                            </p:stCondLst>
+                            <p:childTnLst>
+                              <p:par>
+                                <p:cTn id="72" presetID="10" presetClass="entr" presetSubtype="0" fill="hold" grpId="1" nodeType="clickEffect">
+                                  <p:stCondLst>
+                                    <p:cond delay="0"/>
+                                  </p:stCondLst>
+                                  <p:childTnLst>
+                                    <p:set>
+                                      <p:cBhvr>
+                                        <p:cTn id="73" dur="1" fill="hold">
+                                          <p:stCondLst>
+                                            <p:cond delay="0"/>
+                                          </p:stCondLst>
+                                        </p:cTn>
+                                        <p:tgtEl>
+                                          <p:spTgt spid="46"/>
+                                        </p:tgtEl>
+                                        <p:attrNameLst>
+                                          <p:attrName>style.visibility</p:attrName>
+                                        </p:attrNameLst>
+                                      </p:cBhvr>
+                                      <p:to>
+                                        <p:strVal val="visible"/>
+                                      </p:to>
+                                    </p:set>
+                                    <p:animEffect transition="in" filter="fade">
+                                      <p:cBhvr>
+                                        <p:cTn id="74" dur="500"/>
+                                        <p:tgtEl>
+                                          <p:spTgt spid="46"/>
+                                        </p:tgtEl>
+                                      </p:cBhvr>
+                                    </p:animEffect>
+                                  </p:childTnLst>
+                                </p:cTn>
+                              </p:par>
+                              <p:par>
+                                <p:cTn id="75" presetID="10" presetClass="entr" presetSubtype="0" fill="hold" grpId="1" nodeType="withEffect">
+                                  <p:stCondLst>
+                                    <p:cond delay="0"/>
+                                  </p:stCondLst>
+                                  <p:childTnLst>
+                                    <p:set>
+                                      <p:cBhvr>
+                                        <p:cTn id="76" dur="1" fill="hold">
+                                          <p:stCondLst>
+                                            <p:cond delay="0"/>
+                                          </p:stCondLst>
+                                        </p:cTn>
+                                        <p:tgtEl>
+                                          <p:spTgt spid="57"/>
+                                        </p:tgtEl>
+                                        <p:attrNameLst>
+                                          <p:attrName>style.visibility</p:attrName>
+                                        </p:attrNameLst>
+                                      </p:cBhvr>
+                                      <p:to>
+                                        <p:strVal val="visible"/>
+                                      </p:to>
+                                    </p:set>
+                                    <p:animEffect transition="in" filter="fade">
+                                      <p:cBhvr>
+                                        <p:cTn id="77" dur="500"/>
+                                        <p:tgtEl>
+                                          <p:spTgt spid="57"/>
+                                        </p:tgtEl>
+                                      </p:cBhvr>
+                                    </p:animEffect>
+                                  </p:childTnLst>
+                                </p:cTn>
+                              </p:par>
+                            </p:childTnLst>
+                          </p:cTn>
+                        </p:par>
+                      </p:childTnLst>
+                    </p:cTn>
+                  </p:par>
+                  <p:par>
+                    <p:cTn id="78" fill="hold">
+                      <p:stCondLst>
+                        <p:cond delay="indefinite"/>
+                      </p:stCondLst>
+                      <p:childTnLst>
+                        <p:par>
+                          <p:cTn id="79" fill="hold">
+                            <p:stCondLst>
+                              <p:cond delay="0"/>
+                            </p:stCondLst>
+                            <p:childTnLst>
+                              <p:par>
+                                <p:cTn id="80" presetID="10" presetClass="entr" presetSubtype="0" fill="hold" nodeType="clickEffect">
+                                  <p:stCondLst>
+                                    <p:cond delay="0"/>
+                                  </p:stCondLst>
+                                  <p:childTnLst>
+                                    <p:set>
+                                      <p:cBhvr>
+                                        <p:cTn id="81" dur="1" fill="hold">
+                                          <p:stCondLst>
+                                            <p:cond delay="0"/>
+                                          </p:stCondLst>
+                                        </p:cTn>
+                                        <p:tgtEl>
+                                          <p:spTgt spid="65"/>
+                                        </p:tgtEl>
+                                        <p:attrNameLst>
+                                          <p:attrName>style.visibility</p:attrName>
+                                        </p:attrNameLst>
+                                      </p:cBhvr>
+                                      <p:to>
+                                        <p:strVal val="visible"/>
+                                      </p:to>
+                                    </p:set>
+                                    <p:animEffect transition="in" filter="fade">
+                                      <p:cBhvr>
+                                        <p:cTn id="82" dur="500"/>
+                                        <p:tgtEl>
+                                          <p:spTgt spid="65"/>
+                                        </p:tgtEl>
+                                      </p:cBhvr>
+                                    </p:animEffect>
+                                  </p:childTnLst>
+                                </p:cTn>
+                              </p:par>
+                              <p:par>
+                                <p:cTn id="83" presetID="10" presetClass="entr" presetSubtype="0" fill="hold" nodeType="withEffect">
+                                  <p:stCondLst>
+                                    <p:cond delay="0"/>
+                                  </p:stCondLst>
+                                  <p:childTnLst>
+                                    <p:set>
+                                      <p:cBhvr>
+                                        <p:cTn id="84" dur="1" fill="hold">
+                                          <p:stCondLst>
+                                            <p:cond delay="0"/>
+                                          </p:stCondLst>
+                                        </p:cTn>
+                                        <p:tgtEl>
+                                          <p:spTgt spid="72"/>
+                                        </p:tgtEl>
+                                        <p:attrNameLst>
+                                          <p:attrName>style.visibility</p:attrName>
+                                        </p:attrNameLst>
+                                      </p:cBhvr>
+                                      <p:to>
+                                        <p:strVal val="visible"/>
+                                      </p:to>
+                                    </p:set>
+                                    <p:animEffect transition="in" filter="fade">
+                                      <p:cBhvr>
+                                        <p:cTn id="85" dur="500"/>
+                                        <p:tgtEl>
+                                          <p:spTgt spid="72"/>
+                                        </p:tgtEl>
+                                      </p:cBhvr>
+                                    </p:animEffect>
+                                  </p:childTnLst>
+                                </p:cTn>
+                              </p:par>
+                              <p:par>
+                                <p:cTn id="86" presetID="10" presetClass="entr" presetSubtype="0" fill="hold" nodeType="withEffect">
+                                  <p:stCondLst>
+                                    <p:cond delay="0"/>
+                                  </p:stCondLst>
+                                  <p:childTnLst>
+                                    <p:set>
+                                      <p:cBhvr>
+                                        <p:cTn id="87" dur="1" fill="hold">
+                                          <p:stCondLst>
+                                            <p:cond delay="0"/>
+                                          </p:stCondLst>
+                                        </p:cTn>
+                                        <p:tgtEl>
+                                          <p:spTgt spid="37"/>
+                                        </p:tgtEl>
+                                        <p:attrNameLst>
+                                          <p:attrName>style.visibility</p:attrName>
+                                        </p:attrNameLst>
+                                      </p:cBhvr>
+                                      <p:to>
+                                        <p:strVal val="visible"/>
+                                      </p:to>
+                                    </p:set>
+                                    <p:animEffect transition="in" filter="fade">
+                                      <p:cBhvr>
+                                        <p:cTn id="88" dur="500"/>
+                                        <p:tgtEl>
+                                          <p:spTgt spid="37"/>
+                                        </p:tgtEl>
+                                      </p:cBhvr>
+                                    </p:animEffect>
+                                  </p:childTnLst>
+                                </p:cTn>
+                              </p:par>
+                              <p:par>
+                                <p:cTn id="89" presetID="10" presetClass="entr" presetSubtype="0" fill="hold" nodeType="withEffect">
+                                  <p:stCondLst>
+                                    <p:cond delay="0"/>
+                                  </p:stCondLst>
+                                  <p:childTnLst>
+                                    <p:set>
+                                      <p:cBhvr>
+                                        <p:cTn id="90" dur="1" fill="hold">
+                                          <p:stCondLst>
+                                            <p:cond delay="0"/>
+                                          </p:stCondLst>
+                                        </p:cTn>
+                                        <p:tgtEl>
+                                          <p:spTgt spid="30"/>
+                                        </p:tgtEl>
+                                        <p:attrNameLst>
+                                          <p:attrName>style.visibility</p:attrName>
+                                        </p:attrNameLst>
+                                      </p:cBhvr>
+                                      <p:to>
+                                        <p:strVal val="visible"/>
+                                      </p:to>
+                                    </p:set>
+                                    <p:animEffect transition="in" filter="fade">
+                                      <p:cBhvr>
+                                        <p:cTn id="91" dur="500"/>
+                                        <p:tgtEl>
+                                          <p:spTgt spid="30"/>
+                                        </p:tgtEl>
+                                      </p:cBhvr>
+                                    </p:animEffect>
+                                  </p:childTnLst>
+                                </p:cTn>
+                              </p:par>
+                            </p:childTnLst>
+                          </p:cTn>
+                        </p:par>
+                      </p:childTnLst>
+                    </p:cTn>
+                  </p:par>
+                  <p:par>
+                    <p:cTn id="92" fill="hold">
+                      <p:stCondLst>
+                        <p:cond delay="indefinite"/>
+                      </p:stCondLst>
+                      <p:childTnLst>
+                        <p:par>
+                          <p:cTn id="93" fill="hold">
+                            <p:stCondLst>
+                              <p:cond delay="0"/>
+                            </p:stCondLst>
+                            <p:childTnLst>
+                              <p:par>
+                                <p:cTn id="94" presetID="10" presetClass="entr" presetSubtype="0" fill="hold" nodeType="clickEffect">
+                                  <p:stCondLst>
+                                    <p:cond delay="0"/>
+                                  </p:stCondLst>
+                                  <p:childTnLst>
+                                    <p:set>
+                                      <p:cBhvr>
+                                        <p:cTn id="95" dur="1" fill="hold">
                                           <p:stCondLst>
                                             <p:cond delay="0"/>
                                           </p:stCondLst>
@@ -10357,7 +11987,7 @@
                                     </p:set>
                                     <p:animEffect transition="in" filter="fade">
                                       <p:cBhvr>
-                                        <p:cTn id="43" dur="500"/>
+                                        <p:cTn id="96" dur="500"/>
                                         <p:tgtEl>
                                           <p:spTgt spid="35"/>
                                         </p:tgtEl>
@@ -10367,14 +11997,14 @@
                                 </p:cTn>
                               </p:par>
                               <p:par>
-                                <p:cTn id="44" presetID="10" presetClass="entr" presetSubtype="0" fill="hold" grpId="0" nodeType="withEffect">
+                                <p:cTn id="97" presetID="10" presetClass="entr" presetSubtype="0" fill="hold" grpId="0" nodeType="withEffect">
                                   <p:stCondLst>
                                     <p:cond delay="0"/>
                                   </p:stCondLst>
                                   <p:childTnLst>
                                     <p:set>
                                       <p:cBhvr>
-                                        <p:cTn id="45" dur="1" fill="hold">
+                                        <p:cTn id="98" dur="1" fill="hold">
                                           <p:stCondLst>
                                             <p:cond delay="0"/>
                                           </p:stCondLst>
@@ -10392,7 +12022,7 @@
                                     </p:set>
                                     <p:animEffect transition="in" filter="fade">
                                       <p:cBhvr>
-                                        <p:cTn id="46" dur="500"/>
+                                        <p:cTn id="99" dur="500"/>
                                         <p:tgtEl>
                                           <p:spTgt spid="8"/>
                                         </p:tgtEl>
@@ -10402,14 +12032,14 @@
                                 </p:cTn>
                               </p:par>
                               <p:par>
-                                <p:cTn id="47" presetID="10" presetClass="entr" presetSubtype="0" fill="hold" grpId="0" nodeType="withEffect">
+                                <p:cTn id="100" presetID="10" presetClass="entr" presetSubtype="0" fill="hold" grpId="0" nodeType="withEffect">
                                   <p:stCondLst>
                                     <p:cond delay="0"/>
                                   </p:stCondLst>
                                   <p:childTnLst>
                                     <p:set>
                                       <p:cBhvr>
-                                        <p:cTn id="48" dur="1" fill="hold">
+                                        <p:cTn id="101" dur="1" fill="hold">
                                           <p:stCondLst>
                                             <p:cond delay="0"/>
                                           </p:stCondLst>
@@ -10427,7 +12057,7 @@
                                     </p:set>
                                     <p:animEffect transition="in" filter="fade">
                                       <p:cBhvr>
-                                        <p:cTn id="49" dur="500"/>
+                                        <p:cTn id="102" dur="500"/>
                                         <p:tgtEl>
                                           <p:spTgt spid="33"/>
                                         </p:tgtEl>
@@ -10443,26 +12073,26 @@
                     </p:cTn>
                   </p:par>
                   <p:par>
-                    <p:cTn id="50" fill="hold">
+                    <p:cTn id="103" fill="hold">
                       <p:stCondLst>
                         <p:cond delay="indefinite"/>
                       </p:stCondLst>
                       <p:childTnLst>
                         <p:par>
-                          <p:cTn id="51" fill="hold">
+                          <p:cTn id="104" fill="hold">
                             <p:stCondLst>
                               <p:cond delay="0"/>
                             </p:stCondLst>
                             <p:childTnLst>
                               <p:par>
-                                <p:cTn id="52" presetID="10" presetClass="entr" presetSubtype="0" fill="hold" nodeType="clickEffect">
+                                <p:cTn id="105" presetID="10" presetClass="entr" presetSubtype="0" fill="hold" nodeType="clickEffect">
                                   <p:stCondLst>
                                     <p:cond delay="0"/>
                                   </p:stCondLst>
                                   <p:childTnLst>
                                     <p:set>
                                       <p:cBhvr>
-                                        <p:cTn id="53" dur="1" fill="hold">
+                                        <p:cTn id="106" dur="1" fill="hold">
                                           <p:stCondLst>
                                             <p:cond delay="0"/>
                                           </p:stCondLst>
@@ -10480,7 +12110,7 @@
                                     </p:set>
                                     <p:animEffect transition="in" filter="fade">
                                       <p:cBhvr>
-                                        <p:cTn id="54" dur="500"/>
+                                        <p:cTn id="107" dur="500"/>
                                         <p:tgtEl>
                                           <p:spTgt spid="39"/>
                                         </p:tgtEl>
@@ -10490,14 +12120,14 @@
                                 </p:cTn>
                               </p:par>
                               <p:par>
-                                <p:cTn id="55" presetID="10" presetClass="entr" presetSubtype="0" fill="hold" grpId="0" nodeType="withEffect">
+                                <p:cTn id="108" presetID="10" presetClass="entr" presetSubtype="0" fill="hold" grpId="0" nodeType="withEffect">
                                   <p:stCondLst>
                                     <p:cond delay="0"/>
                                   </p:stCondLst>
                                   <p:childTnLst>
                                     <p:set>
                                       <p:cBhvr>
-                                        <p:cTn id="56" dur="1" fill="hold">
+                                        <p:cTn id="109" dur="1" fill="hold">
                                           <p:stCondLst>
                                             <p:cond delay="0"/>
                                           </p:stCondLst>
@@ -10515,7 +12145,7 @@
                                     </p:set>
                                     <p:animEffect transition="in" filter="fade">
                                       <p:cBhvr>
-                                        <p:cTn id="57" dur="500"/>
+                                        <p:cTn id="110" dur="500"/>
                                         <p:tgtEl>
                                           <p:spTgt spid="9"/>
                                         </p:tgtEl>
@@ -10531,26 +12161,26 @@
                     </p:cTn>
                   </p:par>
                   <p:par>
-                    <p:cTn id="58" fill="hold">
+                    <p:cTn id="111" fill="hold">
                       <p:stCondLst>
                         <p:cond delay="indefinite"/>
                       </p:stCondLst>
                       <p:childTnLst>
                         <p:par>
-                          <p:cTn id="59" fill="hold">
+                          <p:cTn id="112" fill="hold">
                             <p:stCondLst>
                               <p:cond delay="0"/>
                             </p:stCondLst>
                             <p:childTnLst>
                               <p:par>
-                                <p:cTn id="60" presetID="10" presetClass="entr" presetSubtype="0" fill="hold" grpId="0" nodeType="clickEffect">
+                                <p:cTn id="113" presetID="10" presetClass="entr" presetSubtype="0" fill="hold" grpId="0" nodeType="clickEffect">
                                   <p:stCondLst>
                                     <p:cond delay="0"/>
                                   </p:stCondLst>
                                   <p:childTnLst>
                                     <p:set>
                                       <p:cBhvr>
-                                        <p:cTn id="61" dur="1" fill="hold">
+                                        <p:cTn id="114" dur="1" fill="hold">
                                           <p:stCondLst>
                                             <p:cond delay="0"/>
                                           </p:stCondLst>
@@ -10568,7 +12198,7 @@
                                     </p:set>
                                     <p:animEffect transition="in" filter="fade">
                                       <p:cBhvr>
-                                        <p:cTn id="62" dur="500"/>
+                                        <p:cTn id="115" dur="500"/>
                                         <p:tgtEl>
                                           <p:spTgt spid="42"/>
                                         </p:tgtEl>
@@ -10578,14 +12208,14 @@
                                 </p:cTn>
                               </p:par>
                               <p:par>
-                                <p:cTn id="63" presetID="10" presetClass="entr" presetSubtype="0" fill="hold" nodeType="withEffect">
+                                <p:cTn id="116" presetID="10" presetClass="entr" presetSubtype="0" fill="hold" nodeType="withEffect">
                                   <p:stCondLst>
                                     <p:cond delay="0"/>
                                   </p:stCondLst>
                                   <p:childTnLst>
                                     <p:set>
                                       <p:cBhvr>
-                                        <p:cTn id="64" dur="1" fill="hold">
+                                        <p:cTn id="117" dur="1" fill="hold">
                                           <p:stCondLst>
                                             <p:cond delay="0"/>
                                           </p:stCondLst>
@@ -10603,7 +12233,7 @@
                                     </p:set>
                                     <p:animEffect transition="in" filter="fade">
                                       <p:cBhvr>
-                                        <p:cTn id="65" dur="500"/>
+                                        <p:cTn id="118" dur="500"/>
                                         <p:tgtEl>
                                           <p:spTgt spid="45"/>
                                         </p:tgtEl>
@@ -10613,14 +12243,14 @@
                                 </p:cTn>
                               </p:par>
                               <p:par>
-                                <p:cTn id="66" presetID="10" presetClass="entr" presetSubtype="0" fill="hold" grpId="0" nodeType="withEffect">
+                                <p:cTn id="119" presetID="10" presetClass="entr" presetSubtype="0" fill="hold" grpId="0" nodeType="withEffect">
                                   <p:stCondLst>
                                     <p:cond delay="0"/>
                                   </p:stCondLst>
                                   <p:childTnLst>
                                     <p:set>
                                       <p:cBhvr>
-                                        <p:cTn id="67" dur="1" fill="hold">
+                                        <p:cTn id="120" dur="1" fill="hold">
                                           <p:stCondLst>
                                             <p:cond delay="0"/>
                                           </p:stCondLst>
@@ -10638,7 +12268,7 @@
                                     </p:set>
                                     <p:animEffect transition="in" filter="fade">
                                       <p:cBhvr>
-                                        <p:cTn id="68" dur="500"/>
+                                        <p:cTn id="121" dur="500"/>
                                         <p:tgtEl>
                                           <p:spTgt spid="43"/>
                                         </p:tgtEl>
@@ -10648,14 +12278,14 @@
                                 </p:cTn>
                               </p:par>
                               <p:par>
-                                <p:cTn id="69" presetID="10" presetClass="entr" presetSubtype="0" fill="hold" nodeType="withEffect">
+                                <p:cTn id="122" presetID="10" presetClass="entr" presetSubtype="0" fill="hold" nodeType="withEffect">
                                   <p:stCondLst>
                                     <p:cond delay="0"/>
                                   </p:stCondLst>
                                   <p:childTnLst>
                                     <p:set>
                                       <p:cBhvr>
-                                        <p:cTn id="70" dur="1" fill="hold">
+                                        <p:cTn id="123" dur="1" fill="hold">
                                           <p:stCondLst>
                                             <p:cond delay="0"/>
                                           </p:stCondLst>
@@ -10673,7 +12303,7 @@
                                     </p:set>
                                     <p:animEffect transition="in" filter="fade">
                                       <p:cBhvr>
-                                        <p:cTn id="71" dur="500"/>
+                                        <p:cTn id="124" dur="500"/>
                                         <p:tgtEl>
                                           <p:spTgt spid="47"/>
                                         </p:tgtEl>
@@ -10689,26 +12319,26 @@
                     </p:cTn>
                   </p:par>
                   <p:par>
-                    <p:cTn id="72" fill="hold">
+                    <p:cTn id="125" fill="hold">
                       <p:stCondLst>
                         <p:cond delay="indefinite"/>
                       </p:stCondLst>
                       <p:childTnLst>
                         <p:par>
-                          <p:cTn id="73" fill="hold">
+                          <p:cTn id="126" fill="hold">
                             <p:stCondLst>
                               <p:cond delay="0"/>
                             </p:stCondLst>
                             <p:childTnLst>
                               <p:par>
-                                <p:cTn id="74" presetID="10" presetClass="entr" presetSubtype="0" fill="hold" grpId="0" nodeType="clickEffect">
+                                <p:cTn id="127" presetID="10" presetClass="entr" presetSubtype="0" fill="hold" grpId="0" nodeType="clickEffect">
                                   <p:stCondLst>
                                     <p:cond delay="0"/>
                                   </p:stCondLst>
                                   <p:childTnLst>
                                     <p:set>
                                       <p:cBhvr>
-                                        <p:cTn id="75" dur="1" fill="hold">
+                                        <p:cTn id="128" dur="1" fill="hold">
                                           <p:stCondLst>
                                             <p:cond delay="0"/>
                                           </p:stCondLst>
@@ -10726,7 +12356,7 @@
                                     </p:set>
                                     <p:animEffect transition="in" filter="fade">
                                       <p:cBhvr>
-                                        <p:cTn id="76" dur="500"/>
+                                        <p:cTn id="129" dur="500"/>
                                         <p:tgtEl>
                                           <p:spTgt spid="50"/>
                                         </p:tgtEl>
@@ -10736,14 +12366,14 @@
                                 </p:cTn>
                               </p:par>
                               <p:par>
-                                <p:cTn id="77" presetID="10" presetClass="entr" presetSubtype="0" fill="hold" nodeType="withEffect">
+                                <p:cTn id="130" presetID="10" presetClass="entr" presetSubtype="0" fill="hold" nodeType="withEffect">
                                   <p:stCondLst>
                                     <p:cond delay="0"/>
                                   </p:stCondLst>
                                   <p:childTnLst>
                                     <p:set>
                                       <p:cBhvr>
-                                        <p:cTn id="78" dur="1" fill="hold">
+                                        <p:cTn id="131" dur="1" fill="hold">
                                           <p:stCondLst>
                                             <p:cond delay="0"/>
                                           </p:stCondLst>
@@ -10761,7 +12391,7 @@
                                     </p:set>
                                     <p:animEffect transition="in" filter="fade">
                                       <p:cBhvr>
-                                        <p:cTn id="79" dur="500"/>
+                                        <p:cTn id="132" dur="500"/>
                                         <p:tgtEl>
                                           <p:spTgt spid="56"/>
                                         </p:tgtEl>
@@ -10777,26 +12407,26 @@
                     </p:cTn>
                   </p:par>
                   <p:par>
-                    <p:cTn id="80" fill="hold">
+                    <p:cTn id="133" fill="hold">
                       <p:stCondLst>
                         <p:cond delay="indefinite"/>
                       </p:stCondLst>
                       <p:childTnLst>
                         <p:par>
-                          <p:cTn id="81" fill="hold">
+                          <p:cTn id="134" fill="hold">
                             <p:stCondLst>
                               <p:cond delay="0"/>
                             </p:stCondLst>
                             <p:childTnLst>
                               <p:par>
-                                <p:cTn id="82" presetID="10" presetClass="entr" presetSubtype="0" fill="hold" grpId="0" nodeType="clickEffect">
+                                <p:cTn id="135" presetID="10" presetClass="entr" presetSubtype="0" fill="hold" grpId="0" nodeType="clickEffect">
                                   <p:stCondLst>
                                     <p:cond delay="0"/>
                                   </p:stCondLst>
                                   <p:childTnLst>
                                     <p:set>
                                       <p:cBhvr>
-                                        <p:cTn id="83" dur="1" fill="hold">
+                                        <p:cTn id="136" dur="1" fill="hold">
                                           <p:stCondLst>
                                             <p:cond delay="0"/>
                                           </p:stCondLst>
@@ -10814,7 +12444,7 @@
                                     </p:set>
                                     <p:animEffect transition="in" filter="fade">
                                       <p:cBhvr>
-                                        <p:cTn id="84" dur="500"/>
+                                        <p:cTn id="137" dur="500"/>
                                         <p:tgtEl>
                                           <p:spTgt spid="48"/>
                                         </p:tgtEl>
@@ -10824,14 +12454,14 @@
                                 </p:cTn>
                               </p:par>
                               <p:par>
-                                <p:cTn id="85" presetID="10" presetClass="entr" presetSubtype="0" fill="hold" grpId="0" nodeType="withEffect">
+                                <p:cTn id="138" presetID="10" presetClass="entr" presetSubtype="0" fill="hold" grpId="0" nodeType="withEffect">
                                   <p:stCondLst>
                                     <p:cond delay="0"/>
                                   </p:stCondLst>
                                   <p:childTnLst>
                                     <p:set>
                                       <p:cBhvr>
-                                        <p:cTn id="86" dur="1" fill="hold">
+                                        <p:cTn id="139" dur="1" fill="hold">
                                           <p:stCondLst>
                                             <p:cond delay="0"/>
                                           </p:stCondLst>
@@ -10849,7 +12479,7 @@
                                     </p:set>
                                     <p:animEffect transition="in" filter="fade">
                                       <p:cBhvr>
-                                        <p:cTn id="87" dur="500"/>
+                                        <p:cTn id="140" dur="500"/>
                                         <p:tgtEl>
                                           <p:spTgt spid="49"/>
                                         </p:tgtEl>
@@ -10859,14 +12489,14 @@
                                 </p:cTn>
                               </p:par>
                               <p:par>
-                                <p:cTn id="88" presetID="10" presetClass="entr" presetSubtype="0" fill="hold" nodeType="withEffect">
+                                <p:cTn id="141" presetID="10" presetClass="entr" presetSubtype="0" fill="hold" nodeType="withEffect">
                                   <p:stCondLst>
                                     <p:cond delay="0"/>
                                   </p:stCondLst>
                                   <p:childTnLst>
                                     <p:set>
                                       <p:cBhvr>
-                                        <p:cTn id="89" dur="1" fill="hold">
+                                        <p:cTn id="142" dur="1" fill="hold">
                                           <p:stCondLst>
                                             <p:cond delay="0"/>
                                           </p:stCondLst>
@@ -10884,7 +12514,7 @@
                                     </p:set>
                                     <p:animEffect transition="in" filter="fade">
                                       <p:cBhvr>
-                                        <p:cTn id="90" dur="500"/>
+                                        <p:cTn id="143" dur="500"/>
                                         <p:tgtEl>
                                           <p:spTgt spid="52"/>
                                         </p:tgtEl>
@@ -10894,14 +12524,14 @@
                                 </p:cTn>
                               </p:par>
                               <p:par>
-                                <p:cTn id="91" presetID="10" presetClass="entr" presetSubtype="0" fill="hold" nodeType="withEffect">
+                                <p:cTn id="144" presetID="10" presetClass="entr" presetSubtype="0" fill="hold" nodeType="withEffect">
                                   <p:stCondLst>
                                     <p:cond delay="0"/>
                                   </p:stCondLst>
                                   <p:childTnLst>
                                     <p:set>
                                       <p:cBhvr>
-                                        <p:cTn id="92" dur="1" fill="hold">
+                                        <p:cTn id="145" dur="1" fill="hold">
                                           <p:stCondLst>
                                             <p:cond delay="0"/>
                                           </p:stCondLst>
@@ -10919,9 +12549,290 @@
                                     </p:set>
                                     <p:animEffect transition="in" filter="fade">
                                       <p:cBhvr>
-                                        <p:cTn id="93" dur="500"/>
+                                        <p:cTn id="146" dur="500"/>
                                         <p:tgtEl>
                                           <p:spTgt spid="54"/>
+                                        </p:tgtEl>
+                                      </p:cBhvr>
+                                    </p:animEffect>
+                                  </p:childTnLst>
+                                </p:cTn>
+                              </p:par>
+                            </p:childTnLst>
+                          </p:cTn>
+                        </p:par>
+                      </p:childTnLst>
+                    </p:cTn>
+                  </p:par>
+                  <p:par>
+                    <p:cTn id="147" fill="hold">
+                      <p:stCondLst>
+                        <p:cond delay="indefinite"/>
+                      </p:stCondLst>
+                      <p:childTnLst>
+                        <p:par>
+                          <p:cTn id="148" fill="hold">
+                            <p:stCondLst>
+                              <p:cond delay="0"/>
+                            </p:stCondLst>
+                            <p:childTnLst>
+                              <p:par>
+                                <p:cTn id="149" presetID="10" presetClass="entr" presetSubtype="0" fill="hold" grpId="0" nodeType="clickEffect">
+                                  <p:stCondLst>
+                                    <p:cond delay="0"/>
+                                  </p:stCondLst>
+                                  <p:childTnLst>
+                                    <p:set>
+                                      <p:cBhvr>
+                                        <p:cTn id="150" dur="1" fill="hold">
+                                          <p:stCondLst>
+                                            <p:cond delay="0"/>
+                                          </p:stCondLst>
+                                        </p:cTn>
+                                        <p:tgtEl>
+                                          <p:spTgt spid="87"/>
+                                        </p:tgtEl>
+                                        <p:attrNameLst>
+                                          <p:attrName>style.visibility</p:attrName>
+                                        </p:attrNameLst>
+                                      </p:cBhvr>
+                                      <p:to>
+                                        <p:strVal val="visible"/>
+                                      </p:to>
+                                    </p:set>
+                                    <p:animEffect transition="in" filter="fade">
+                                      <p:cBhvr>
+                                        <p:cTn id="151" dur="500"/>
+                                        <p:tgtEl>
+                                          <p:spTgt spid="87"/>
+                                        </p:tgtEl>
+                                      </p:cBhvr>
+                                    </p:animEffect>
+                                  </p:childTnLst>
+                                </p:cTn>
+                              </p:par>
+                            </p:childTnLst>
+                          </p:cTn>
+                        </p:par>
+                      </p:childTnLst>
+                    </p:cTn>
+                  </p:par>
+                  <p:par>
+                    <p:cTn id="152" fill="hold">
+                      <p:stCondLst>
+                        <p:cond delay="indefinite"/>
+                      </p:stCondLst>
+                      <p:childTnLst>
+                        <p:par>
+                          <p:cTn id="153" fill="hold">
+                            <p:stCondLst>
+                              <p:cond delay="0"/>
+                            </p:stCondLst>
+                            <p:childTnLst>
+                              <p:par>
+                                <p:cTn id="154" presetID="22" presetClass="entr" presetSubtype="4" fill="hold" grpId="0" nodeType="clickEffect">
+                                  <p:stCondLst>
+                                    <p:cond delay="0"/>
+                                  </p:stCondLst>
+                                  <p:childTnLst>
+                                    <p:set>
+                                      <p:cBhvr>
+                                        <p:cTn id="155" dur="1" fill="hold">
+                                          <p:stCondLst>
+                                            <p:cond delay="0"/>
+                                          </p:stCondLst>
+                                        </p:cTn>
+                                        <p:tgtEl>
+                                          <p:spTgt spid="88"/>
+                                        </p:tgtEl>
+                                        <p:attrNameLst>
+                                          <p:attrName>style.visibility</p:attrName>
+                                        </p:attrNameLst>
+                                      </p:cBhvr>
+                                      <p:to>
+                                        <p:strVal val="visible"/>
+                                      </p:to>
+                                    </p:set>
+                                    <p:animEffect transition="in" filter="wipe(down)">
+                                      <p:cBhvr>
+                                        <p:cTn id="156" dur="500"/>
+                                        <p:tgtEl>
+                                          <p:spTgt spid="88"/>
+                                        </p:tgtEl>
+                                      </p:cBhvr>
+                                    </p:animEffect>
+                                  </p:childTnLst>
+                                </p:cTn>
+                              </p:par>
+                              <p:par>
+                                <p:cTn id="157" presetID="22" presetClass="entr" presetSubtype="4" fill="hold" grpId="0" nodeType="withEffect">
+                                  <p:stCondLst>
+                                    <p:cond delay="0"/>
+                                  </p:stCondLst>
+                                  <p:childTnLst>
+                                    <p:set>
+                                      <p:cBhvr>
+                                        <p:cTn id="158" dur="1" fill="hold">
+                                          <p:stCondLst>
+                                            <p:cond delay="0"/>
+                                          </p:stCondLst>
+                                        </p:cTn>
+                                        <p:tgtEl>
+                                          <p:spTgt spid="89"/>
+                                        </p:tgtEl>
+                                        <p:attrNameLst>
+                                          <p:attrName>style.visibility</p:attrName>
+                                        </p:attrNameLst>
+                                      </p:cBhvr>
+                                      <p:to>
+                                        <p:strVal val="visible"/>
+                                      </p:to>
+                                    </p:set>
+                                    <p:animEffect transition="in" filter="wipe(down)">
+                                      <p:cBhvr>
+                                        <p:cTn id="159" dur="500"/>
+                                        <p:tgtEl>
+                                          <p:spTgt spid="89"/>
+                                        </p:tgtEl>
+                                      </p:cBhvr>
+                                    </p:animEffect>
+                                  </p:childTnLst>
+                                </p:cTn>
+                              </p:par>
+                              <p:par>
+                                <p:cTn id="160" presetID="22" presetClass="entr" presetSubtype="4" fill="hold" grpId="0" nodeType="withEffect">
+                                  <p:stCondLst>
+                                    <p:cond delay="0"/>
+                                  </p:stCondLst>
+                                  <p:childTnLst>
+                                    <p:set>
+                                      <p:cBhvr>
+                                        <p:cTn id="161" dur="1" fill="hold">
+                                          <p:stCondLst>
+                                            <p:cond delay="0"/>
+                                          </p:stCondLst>
+                                        </p:cTn>
+                                        <p:tgtEl>
+                                          <p:spTgt spid="90"/>
+                                        </p:tgtEl>
+                                        <p:attrNameLst>
+                                          <p:attrName>style.visibility</p:attrName>
+                                        </p:attrNameLst>
+                                      </p:cBhvr>
+                                      <p:to>
+                                        <p:strVal val="visible"/>
+                                      </p:to>
+                                    </p:set>
+                                    <p:animEffect transition="in" filter="wipe(down)">
+                                      <p:cBhvr>
+                                        <p:cTn id="162" dur="500"/>
+                                        <p:tgtEl>
+                                          <p:spTgt spid="90"/>
+                                        </p:tgtEl>
+                                      </p:cBhvr>
+                                    </p:animEffect>
+                                  </p:childTnLst>
+                                </p:cTn>
+                              </p:par>
+                              <p:par>
+                                <p:cTn id="163" presetID="22" presetClass="entr" presetSubtype="4" fill="hold" nodeType="withEffect">
+                                  <p:stCondLst>
+                                    <p:cond delay="0"/>
+                                  </p:stCondLst>
+                                  <p:childTnLst>
+                                    <p:set>
+                                      <p:cBhvr>
+                                        <p:cTn id="164" dur="1" fill="hold">
+                                          <p:stCondLst>
+                                            <p:cond delay="0"/>
+                                          </p:stCondLst>
+                                        </p:cTn>
+                                        <p:tgtEl>
+                                          <p:spTgt spid="93"/>
+                                        </p:tgtEl>
+                                        <p:attrNameLst>
+                                          <p:attrName>style.visibility</p:attrName>
+                                        </p:attrNameLst>
+                                      </p:cBhvr>
+                                      <p:to>
+                                        <p:strVal val="visible"/>
+                                      </p:to>
+                                    </p:set>
+                                    <p:animEffect transition="in" filter="wipe(down)">
+                                      <p:cBhvr>
+                                        <p:cTn id="165" dur="500"/>
+                                        <p:tgtEl>
+                                          <p:spTgt spid="93"/>
+                                        </p:tgtEl>
+                                      </p:cBhvr>
+                                    </p:animEffect>
+                                  </p:childTnLst>
+                                </p:cTn>
+                              </p:par>
+                              <p:par>
+                                <p:cTn id="166" presetID="22" presetClass="entr" presetSubtype="4" fill="hold" nodeType="withEffect">
+                                  <p:stCondLst>
+                                    <p:cond delay="0"/>
+                                  </p:stCondLst>
+                                  <p:childTnLst>
+                                    <p:set>
+                                      <p:cBhvr>
+                                        <p:cTn id="167" dur="1" fill="hold">
+                                          <p:stCondLst>
+                                            <p:cond delay="0"/>
+                                          </p:stCondLst>
+                                        </p:cTn>
+                                        <p:tgtEl>
+                                          <p:spTgt spid="92"/>
+                                        </p:tgtEl>
+                                        <p:attrNameLst>
+                                          <p:attrName>style.visibility</p:attrName>
+                                        </p:attrNameLst>
+                                      </p:cBhvr>
+                                      <p:to>
+                                        <p:strVal val="visible"/>
+                                      </p:to>
+                                    </p:set>
+                                    <p:animEffect transition="in" filter="wipe(down)">
+                                      <p:cBhvr>
+                                        <p:cTn id="168" dur="500"/>
+                                        <p:tgtEl>
+                                          <p:spTgt spid="92"/>
+                                        </p:tgtEl>
+                                      </p:cBhvr>
+                                    </p:animEffect>
+                                  </p:childTnLst>
+                                </p:cTn>
+                              </p:par>
+                              <p:par>
+                                <p:cTn id="169" presetID="22" presetClass="entr" presetSubtype="4" fill="hold" nodeType="withEffect">
+                                  <p:stCondLst>
+                                    <p:cond delay="0"/>
+                                  </p:stCondLst>
+                                  <p:childTnLst>
+                                    <p:set>
+                                      <p:cBhvr>
+                                        <p:cTn id="170" dur="1" fill="hold">
+                                          <p:stCondLst>
+                                            <p:cond delay="0"/>
+                                          </p:stCondLst>
+                                        </p:cTn>
+                                        <p:tgtEl>
+                                          <p:spTgt spid="97"/>
+                                        </p:tgtEl>
+                                        <p:attrNameLst>
+                                          <p:attrName>style.visibility</p:attrName>
+                                        </p:attrNameLst>
+                                      </p:cBhvr>
+                                      <p:to>
+                                        <p:strVal val="visible"/>
+                                      </p:to>
+                                    </p:set>
+                                    <p:animEffect transition="in" filter="wipe(down)">
+                                      <p:cBhvr>
+                                        <p:cTn id="171" dur="500"/>
+                                        <p:tgtEl>
+                                          <p:spTgt spid="97"/>
                                         </p:tgtEl>
                                       </p:cBhvr>
                                     </p:animEffect>
@@ -10957,19 +12868,30 @@
     </p:tnLst>
     <p:bldLst>
       <p:bldP spid="5" grpId="0" animBg="1"/>
+      <p:bldP spid="5" grpId="1" animBg="1"/>
       <p:bldP spid="6" grpId="0" animBg="1"/>
+      <p:bldP spid="6" grpId="1" animBg="1"/>
       <p:bldP spid="7" grpId="0" animBg="1"/>
       <p:bldP spid="8" grpId="0" animBg="1"/>
       <p:bldP spid="9" grpId="0" animBg="1"/>
       <p:bldP spid="10" grpId="0" animBg="1"/>
       <p:bldP spid="25" grpId="0" animBg="1"/>
+      <p:bldP spid="25" grpId="1" animBg="1"/>
       <p:bldP spid="20" grpId="0" animBg="1"/>
+      <p:bldP spid="20" grpId="1" animBg="1"/>
       <p:bldP spid="33" grpId="0" animBg="1"/>
       <p:bldP spid="42" grpId="0" animBg="1"/>
       <p:bldP spid="43" grpId="0" animBg="1"/>
       <p:bldP spid="48" grpId="0" animBg="1"/>
       <p:bldP spid="49" grpId="0" animBg="1"/>
       <p:bldP spid="50" grpId="0" animBg="1"/>
+      <p:bldP spid="46" grpId="1" animBg="1"/>
+      <p:bldP spid="57" grpId="1" animBg="1"/>
+      <p:bldP spid="63" grpId="0" animBg="1"/>
+      <p:bldP spid="87" grpId="0" animBg="1"/>
+      <p:bldP spid="88" grpId="0" animBg="1"/>
+      <p:bldP spid="89" grpId="0" animBg="1"/>
+      <p:bldP spid="90" grpId="0" animBg="1"/>
     </p:bldLst>
   </p:timing>
 </p:sld>
@@ -11503,6 +13425,62 @@
           <a:p>
             <a:pPr algn="ctr"/>
             <a:endParaRPr lang="ru-RU"/>
+          </a:p>
+        </p:txBody>
+      </p:sp>
+      <p:sp>
+        <p:nvSpPr>
+          <p:cNvPr id="14" name="TextBox 13"/>
+          <p:cNvSpPr txBox="1"/>
+          <p:nvPr/>
+        </p:nvSpPr>
+        <p:spPr>
+          <a:xfrm>
+            <a:off x="8167087" y="356441"/>
+            <a:ext cx="848309" cy="261610"/>
+          </a:xfrm>
+          <a:prstGeom prst="rect">
+            <a:avLst/>
+          </a:prstGeom>
+          <a:noFill/>
+        </p:spPr>
+        <p:txBody>
+          <a:bodyPr wrap="none" rtlCol="0">
+            <a:spAutoFit/>
+          </a:bodyPr>
+          <a:lstStyle/>
+          <a:p>
+            <a:r>
+              <a:rPr lang="ru-RU" sz="1100" dirty="0" smtClean="0">
+                <a:solidFill>
+                  <a:schemeClr val="bg1"/>
+                </a:solidFill>
+                <a:effectLst>
+                  <a:outerShdw blurRad="38100" dist="38100" dir="2700000" algn="tl">
+                    <a:srgbClr val="000000">
+                      <a:alpha val="43137"/>
+                    </a:srgbClr>
+                  </a:outerShdw>
+                </a:effectLst>
+                <a:latin typeface="Segoe UI" panose="020B0502040204020203" pitchFamily="34" charset="0"/>
+                <a:cs typeface="Segoe UI" panose="020B0502040204020203" pitchFamily="34" charset="0"/>
+              </a:rPr>
+              <a:t>Слайд №8</a:t>
+            </a:r>
+            <a:endParaRPr lang="ru-RU" sz="1100" dirty="0">
+              <a:solidFill>
+                <a:schemeClr val="bg1"/>
+              </a:solidFill>
+              <a:effectLst>
+                <a:outerShdw blurRad="38100" dist="38100" dir="2700000" algn="tl">
+                  <a:srgbClr val="000000">
+                    <a:alpha val="43137"/>
+                  </a:srgbClr>
+                </a:outerShdw>
+              </a:effectLst>
+              <a:latin typeface="Segoe UI" panose="020B0502040204020203" pitchFamily="34" charset="0"/>
+              <a:cs typeface="Segoe UI" panose="020B0502040204020203" pitchFamily="34" charset="0"/>
+            </a:endParaRPr>
           </a:p>
         </p:txBody>
       </p:sp>
@@ -12056,7 +14034,7 @@
         <p:spPr>
           <a:xfrm>
             <a:off x="4448816" y="956231"/>
-            <a:ext cx="3888432" cy="4278094"/>
+            <a:ext cx="3888432" cy="4031873"/>
           </a:xfrm>
           <a:prstGeom prst="rect">
             <a:avLst/>
@@ -12093,10 +14071,6 @@
               </a:rPr>
               <a:t>.</a:t>
             </a:r>
-            <a:endParaRPr lang="en-US" sz="1600" dirty="0" smtClean="0">
-              <a:latin typeface="Segoe UI Semilight" panose="020B0402040204020203" pitchFamily="34" charset="0"/>
-              <a:cs typeface="Segoe UI Semilight" panose="020B0402040204020203" pitchFamily="34" charset="0"/>
-            </a:endParaRPr>
           </a:p>
           <a:p>
             <a:endParaRPr lang="en-US" sz="1600" dirty="0">
@@ -12110,35 +14084,7 @@
                 <a:latin typeface="Segoe UI Semilight" panose="020B0402040204020203" pitchFamily="34" charset="0"/>
                 <a:cs typeface="Segoe UI Semilight" panose="020B0402040204020203" pitchFamily="34" charset="0"/>
               </a:rPr>
-              <a:t>Аккумулируя в себе возможности </a:t>
-            </a:r>
-            <a:r>
-              <a:rPr lang="ru-RU" sz="1600" dirty="0" err="1" smtClean="0">
-                <a:latin typeface="Segoe UI Semilight" panose="020B0402040204020203" pitchFamily="34" charset="0"/>
-                <a:cs typeface="Segoe UI Semilight" panose="020B0402040204020203" pitchFamily="34" charset="0"/>
-              </a:rPr>
-              <a:t>парсера</a:t>
-            </a:r>
-            <a:r>
-              <a:rPr lang="ru-RU" sz="1600" dirty="0" smtClean="0">
-                <a:latin typeface="Segoe UI Semilight" panose="020B0402040204020203" pitchFamily="34" charset="0"/>
-                <a:cs typeface="Segoe UI Semilight" panose="020B0402040204020203" pitchFamily="34" charset="0"/>
-              </a:rPr>
-              <a:t> и </a:t>
-            </a:r>
-            <a:r>
-              <a:rPr lang="ru-RU" sz="1600" dirty="0" err="1" smtClean="0">
-                <a:latin typeface="Segoe UI Semilight" panose="020B0402040204020203" pitchFamily="34" charset="0"/>
-                <a:cs typeface="Segoe UI Semilight" panose="020B0402040204020203" pitchFamily="34" charset="0"/>
-              </a:rPr>
-              <a:t>лексера</a:t>
-            </a:r>
-            <a:r>
-              <a:rPr lang="ru-RU" sz="1600" dirty="0" smtClean="0">
-                <a:latin typeface="Segoe UI Semilight" panose="020B0402040204020203" pitchFamily="34" charset="0"/>
-                <a:cs typeface="Segoe UI Semilight" panose="020B0402040204020203" pitchFamily="34" charset="0"/>
-              </a:rPr>
-              <a:t> данных значений, а также имея активное сообщество, </a:t>
+              <a:t>Аккумулируя в себе возможности все нужные функции, а также имея активное сообщество, </a:t>
             </a:r>
             <a:r>
               <a:rPr lang="en-US" sz="1600" dirty="0" smtClean="0">
@@ -12165,14 +14111,7 @@
                 <a:latin typeface="Segoe UI Semilight" panose="020B0402040204020203" pitchFamily="34" charset="0"/>
                 <a:cs typeface="Segoe UI Semilight" panose="020B0402040204020203" pitchFamily="34" charset="0"/>
               </a:rPr>
-              <a:t>является </a:t>
-            </a:r>
-            <a:r>
-              <a:rPr lang="ru-RU" sz="1600" dirty="0" smtClean="0">
-                <a:latin typeface="Segoe UI Semilight" panose="020B0402040204020203" pitchFamily="34" charset="0"/>
-                <a:cs typeface="Segoe UI Semilight" panose="020B0402040204020203" pitchFamily="34" charset="0"/>
-              </a:rPr>
-              <a:t>тем инструментом, который я бы хотел в ближайшее время изучить и использовать в своей программе.</a:t>
+              <a:t>является тем инструментом, который я бы хотел в ближайшее время изучить и использовать в своей программе.</a:t>
             </a:r>
           </a:p>
           <a:p>
@@ -12237,6 +14176,62 @@
           <a:p>
             <a:pPr algn="ctr"/>
             <a:endParaRPr lang="ru-RU"/>
+          </a:p>
+        </p:txBody>
+      </p:sp>
+      <p:sp>
+        <p:nvSpPr>
+          <p:cNvPr id="8" name="TextBox 7"/>
+          <p:cNvSpPr txBox="1"/>
+          <p:nvPr/>
+        </p:nvSpPr>
+        <p:spPr>
+          <a:xfrm>
+            <a:off x="8167087" y="356441"/>
+            <a:ext cx="848309" cy="261610"/>
+          </a:xfrm>
+          <a:prstGeom prst="rect">
+            <a:avLst/>
+          </a:prstGeom>
+          <a:noFill/>
+        </p:spPr>
+        <p:txBody>
+          <a:bodyPr wrap="none" rtlCol="0">
+            <a:spAutoFit/>
+          </a:bodyPr>
+          <a:lstStyle/>
+          <a:p>
+            <a:r>
+              <a:rPr lang="ru-RU" sz="1100" dirty="0" smtClean="0">
+                <a:solidFill>
+                  <a:schemeClr val="bg1"/>
+                </a:solidFill>
+                <a:effectLst>
+                  <a:outerShdw blurRad="38100" dist="38100" dir="2700000" algn="tl">
+                    <a:srgbClr val="000000">
+                      <a:alpha val="43137"/>
+                    </a:srgbClr>
+                  </a:outerShdw>
+                </a:effectLst>
+                <a:latin typeface="Segoe UI" panose="020B0502040204020203" pitchFamily="34" charset="0"/>
+                <a:cs typeface="Segoe UI" panose="020B0502040204020203" pitchFamily="34" charset="0"/>
+              </a:rPr>
+              <a:t>Слайд №9</a:t>
+            </a:r>
+            <a:endParaRPr lang="ru-RU" sz="1100" dirty="0">
+              <a:solidFill>
+                <a:schemeClr val="bg1"/>
+              </a:solidFill>
+              <a:effectLst>
+                <a:outerShdw blurRad="38100" dist="38100" dir="2700000" algn="tl">
+                  <a:srgbClr val="000000">
+                    <a:alpha val="43137"/>
+                  </a:srgbClr>
+                </a:outerShdw>
+              </a:effectLst>
+              <a:latin typeface="Segoe UI" panose="020B0502040204020203" pitchFamily="34" charset="0"/>
+              <a:cs typeface="Segoe UI" panose="020B0502040204020203" pitchFamily="34" charset="0"/>
+            </a:endParaRPr>
           </a:p>
         </p:txBody>
       </p:sp>

</xml_diff>